<commit_message>
Face cards now have different values when shown in highest card ie King beats Queen which beats Jack
</commit_message>
<xml_diff>
--- a/BlackJackPresentation.pptx
+++ b/BlackJackPresentation.pptx
@@ -5,19 +5,20 @@
     <p:sldMasterId id="2147483648" r:id="rId1"/>
   </p:sldMasterIdLst>
   <p:notesMasterIdLst>
-    <p:notesMasterId r:id="rId12"/>
+    <p:notesMasterId r:id="rId13"/>
   </p:notesMasterIdLst>
   <p:sldIdLst>
-    <p:sldId id="256" r:id="rId2"/>
-    <p:sldId id="261" r:id="rId3"/>
-    <p:sldId id="257" r:id="rId4"/>
-    <p:sldId id="258" r:id="rId5"/>
-    <p:sldId id="259" r:id="rId6"/>
-    <p:sldId id="260" r:id="rId7"/>
-    <p:sldId id="262" r:id="rId8"/>
-    <p:sldId id="263" r:id="rId9"/>
-    <p:sldId id="264" r:id="rId10"/>
-    <p:sldId id="265" r:id="rId11"/>
+    <p:sldId id="266" r:id="rId2"/>
+    <p:sldId id="256" r:id="rId3"/>
+    <p:sldId id="261" r:id="rId4"/>
+    <p:sldId id="257" r:id="rId5"/>
+    <p:sldId id="258" r:id="rId6"/>
+    <p:sldId id="259" r:id="rId7"/>
+    <p:sldId id="260" r:id="rId8"/>
+    <p:sldId id="262" r:id="rId9"/>
+    <p:sldId id="263" r:id="rId10"/>
+    <p:sldId id="264" r:id="rId11"/>
+    <p:sldId id="265" r:id="rId12"/>
   </p:sldIdLst>
   <p:sldSz cx="12192000" cy="6858000"/>
   <p:notesSz cx="6858000" cy="9144000"/>
@@ -467,6 +468,853 @@
     </a:lvl9pPr>
   </p:notesStyle>
 </p:notesMaster>
+</file>
+
+<file path=ppt/notesSlides/notesSlide1.xml><?xml version="1.0" encoding="utf-8"?>
+<p:notes xmlns:a="http://schemas.openxmlformats.org/drawingml/2006/main" xmlns:r="http://schemas.openxmlformats.org/officeDocument/2006/relationships" xmlns:p="http://schemas.openxmlformats.org/presentationml/2006/main">
+  <p:cSld>
+    <p:spTree>
+      <p:nvGrpSpPr>
+        <p:cNvPr id="1" name=""/>
+        <p:cNvGrpSpPr/>
+        <p:nvPr/>
+      </p:nvGrpSpPr>
+      <p:grpSpPr>
+        <a:xfrm>
+          <a:off x="0" y="0"/>
+          <a:ext cx="0" cy="0"/>
+          <a:chOff x="0" y="0"/>
+          <a:chExt cx="0" cy="0"/>
+        </a:xfrm>
+      </p:grpSpPr>
+      <p:sp>
+        <p:nvSpPr>
+          <p:cNvPr id="2" name="Slide Image Placeholder 1"/>
+          <p:cNvSpPr>
+            <a:spLocks noGrp="1" noRot="1" noChangeAspect="1"/>
+          </p:cNvSpPr>
+          <p:nvPr>
+            <p:ph type="sldImg"/>
+          </p:nvPr>
+        </p:nvSpPr>
+        <p:spPr/>
+      </p:sp>
+      <p:sp>
+        <p:nvSpPr>
+          <p:cNvPr id="3" name="Notes Placeholder 2"/>
+          <p:cNvSpPr>
+            <a:spLocks noGrp="1"/>
+          </p:cNvSpPr>
+          <p:nvPr>
+            <p:ph type="body" idx="1"/>
+          </p:nvPr>
+        </p:nvSpPr>
+        <p:spPr/>
+        <p:txBody>
+          <a:bodyPr/>
+          <a:lstStyle/>
+          <a:p>
+            <a:r>
+              <a:rPr lang="en-US" dirty="0" smtClean="0"/>
+              <a:t>- I chose to do the card</a:t>
+            </a:r>
+            <a:r>
+              <a:rPr lang="en-US" baseline="0" dirty="0" smtClean="0"/>
+              <a:t> game brief as I enjoy working with user interfaces and wanted to have a go at doing this in android but also felt that I was struggling with the Java so felt the card game would allow me to work on this.</a:t>
+            </a:r>
+          </a:p>
+          <a:p>
+            <a:endParaRPr lang="en-US" baseline="0" dirty="0" smtClean="0"/>
+          </a:p>
+          <a:p>
+            <a:r>
+              <a:rPr lang="en-US" baseline="0" dirty="0" smtClean="0"/>
+              <a:t>- </a:t>
+            </a:r>
+            <a:r>
+              <a:rPr lang="en-US" baseline="0" dirty="0" err="1" smtClean="0"/>
+              <a:t>i</a:t>
+            </a:r>
+            <a:r>
+              <a:rPr lang="en-US" baseline="0" dirty="0" smtClean="0"/>
+              <a:t> found the brief to be challenging but it got easier the more time I spent on it and I felt it has helped me understand Java, as well as some of the. other principles we have been learning, like TDD and SOLID.</a:t>
+            </a:r>
+          </a:p>
+          <a:p>
+            <a:endParaRPr lang="en-US" baseline="0" dirty="0" smtClean="0"/>
+          </a:p>
+          <a:p>
+            <a:r>
+              <a:rPr lang="en-US" baseline="0" dirty="0" smtClean="0"/>
+              <a:t>- the project has really helped me to consolidate the things we have been learning for the last 8 weeks and I feel like I understand much more now</a:t>
+            </a:r>
+            <a:endParaRPr lang="en-US" dirty="0"/>
+          </a:p>
+        </p:txBody>
+      </p:sp>
+      <p:sp>
+        <p:nvSpPr>
+          <p:cNvPr id="4" name="Slide Number Placeholder 3"/>
+          <p:cNvSpPr>
+            <a:spLocks noGrp="1"/>
+          </p:cNvSpPr>
+          <p:nvPr>
+            <p:ph type="sldNum" sz="quarter" idx="10"/>
+          </p:nvPr>
+        </p:nvSpPr>
+        <p:spPr/>
+        <p:txBody>
+          <a:bodyPr/>
+          <a:lstStyle/>
+          <a:p>
+            <a:fld id="{605307A0-C806-7944-8A93-6CB5551D8580}" type="slidenum">
+              <a:rPr lang="en-US" smtClean="0"/>
+              <a:t>2</a:t>
+            </a:fld>
+            <a:endParaRPr lang="en-US"/>
+          </a:p>
+        </p:txBody>
+      </p:sp>
+    </p:spTree>
+    <p:extLst>
+      <p:ext uri="{BB962C8B-B14F-4D97-AF65-F5344CB8AC3E}">
+        <p14:creationId xmlns:p14="http://schemas.microsoft.com/office/powerpoint/2010/main" val="1288246312"/>
+      </p:ext>
+    </p:extLst>
+  </p:cSld>
+  <p:clrMapOvr>
+    <a:masterClrMapping/>
+  </p:clrMapOvr>
+</p:notes>
+</file>
+
+<file path=ppt/notesSlides/notesSlide2.xml><?xml version="1.0" encoding="utf-8"?>
+<p:notes xmlns:a="http://schemas.openxmlformats.org/drawingml/2006/main" xmlns:r="http://schemas.openxmlformats.org/officeDocument/2006/relationships" xmlns:p="http://schemas.openxmlformats.org/presentationml/2006/main">
+  <p:cSld>
+    <p:spTree>
+      <p:nvGrpSpPr>
+        <p:cNvPr id="1" name=""/>
+        <p:cNvGrpSpPr/>
+        <p:nvPr/>
+      </p:nvGrpSpPr>
+      <p:grpSpPr>
+        <a:xfrm>
+          <a:off x="0" y="0"/>
+          <a:ext cx="0" cy="0"/>
+          <a:chOff x="0" y="0"/>
+          <a:chExt cx="0" cy="0"/>
+        </a:xfrm>
+      </p:grpSpPr>
+      <p:sp>
+        <p:nvSpPr>
+          <p:cNvPr id="2" name="Slide Image Placeholder 1"/>
+          <p:cNvSpPr>
+            <a:spLocks noGrp="1" noRot="1" noChangeAspect="1"/>
+          </p:cNvSpPr>
+          <p:nvPr>
+            <p:ph type="sldImg"/>
+          </p:nvPr>
+        </p:nvSpPr>
+        <p:spPr/>
+      </p:sp>
+      <p:sp>
+        <p:nvSpPr>
+          <p:cNvPr id="3" name="Notes Placeholder 2"/>
+          <p:cNvSpPr>
+            <a:spLocks noGrp="1"/>
+          </p:cNvSpPr>
+          <p:nvPr>
+            <p:ph type="body" idx="1"/>
+          </p:nvPr>
+        </p:nvSpPr>
+        <p:spPr/>
+        <p:txBody>
+          <a:bodyPr/>
+          <a:lstStyle/>
+          <a:p>
+            <a:r>
+              <a:rPr lang="en-US" dirty="0" smtClean="0"/>
+              <a:t>- I started with some planning.</a:t>
+            </a:r>
+          </a:p>
+          <a:p>
+            <a:endParaRPr lang="en-US" dirty="0" smtClean="0"/>
+          </a:p>
+          <a:p>
+            <a:r>
+              <a:rPr lang="en-US" dirty="0" smtClean="0"/>
+              <a:t>-I</a:t>
+            </a:r>
+            <a:r>
+              <a:rPr lang="en-US" baseline="0" dirty="0" smtClean="0"/>
+              <a:t> made a Trello board but must confess I didn't use it very much.  I tend to set these up and then forget to back to them so hoping to make more use of this next time.</a:t>
+            </a:r>
+            <a:endParaRPr lang="en-US" dirty="0"/>
+          </a:p>
+        </p:txBody>
+      </p:sp>
+      <p:sp>
+        <p:nvSpPr>
+          <p:cNvPr id="4" name="Slide Number Placeholder 3"/>
+          <p:cNvSpPr>
+            <a:spLocks noGrp="1"/>
+          </p:cNvSpPr>
+          <p:nvPr>
+            <p:ph type="sldNum" sz="quarter" idx="10"/>
+          </p:nvPr>
+        </p:nvSpPr>
+        <p:spPr/>
+        <p:txBody>
+          <a:bodyPr/>
+          <a:lstStyle/>
+          <a:p>
+            <a:fld id="{605307A0-C806-7944-8A93-6CB5551D8580}" type="slidenum">
+              <a:rPr lang="en-US" smtClean="0"/>
+              <a:t>3</a:t>
+            </a:fld>
+            <a:endParaRPr lang="en-US"/>
+          </a:p>
+        </p:txBody>
+      </p:sp>
+    </p:spTree>
+    <p:extLst>
+      <p:ext uri="{BB962C8B-B14F-4D97-AF65-F5344CB8AC3E}">
+        <p14:creationId xmlns:p14="http://schemas.microsoft.com/office/powerpoint/2010/main" val="1747103591"/>
+      </p:ext>
+    </p:extLst>
+  </p:cSld>
+  <p:clrMapOvr>
+    <a:masterClrMapping/>
+  </p:clrMapOvr>
+</p:notes>
+</file>
+
+<file path=ppt/notesSlides/notesSlide3.xml><?xml version="1.0" encoding="utf-8"?>
+<p:notes xmlns:a="http://schemas.openxmlformats.org/drawingml/2006/main" xmlns:r="http://schemas.openxmlformats.org/officeDocument/2006/relationships" xmlns:p="http://schemas.openxmlformats.org/presentationml/2006/main">
+  <p:cSld>
+    <p:spTree>
+      <p:nvGrpSpPr>
+        <p:cNvPr id="1" name=""/>
+        <p:cNvGrpSpPr/>
+        <p:nvPr/>
+      </p:nvGrpSpPr>
+      <p:grpSpPr>
+        <a:xfrm>
+          <a:off x="0" y="0"/>
+          <a:ext cx="0" cy="0"/>
+          <a:chOff x="0" y="0"/>
+          <a:chExt cx="0" cy="0"/>
+        </a:xfrm>
+      </p:grpSpPr>
+      <p:sp>
+        <p:nvSpPr>
+          <p:cNvPr id="2" name="Slide Image Placeholder 1"/>
+          <p:cNvSpPr>
+            <a:spLocks noGrp="1" noRot="1" noChangeAspect="1"/>
+          </p:cNvSpPr>
+          <p:nvPr>
+            <p:ph type="sldImg"/>
+          </p:nvPr>
+        </p:nvSpPr>
+        <p:spPr/>
+      </p:sp>
+      <p:sp>
+        <p:nvSpPr>
+          <p:cNvPr id="3" name="Notes Placeholder 2"/>
+          <p:cNvSpPr>
+            <a:spLocks noGrp="1"/>
+          </p:cNvSpPr>
+          <p:nvPr>
+            <p:ph type="body" idx="1"/>
+          </p:nvPr>
+        </p:nvSpPr>
+        <p:spPr/>
+        <p:txBody>
+          <a:bodyPr/>
+          <a:lstStyle/>
+          <a:p>
+            <a:r>
+              <a:rPr lang="en-US" dirty="0" smtClean="0"/>
+              <a:t>- being quite a visual person, I though</a:t>
+            </a:r>
+            <a:r>
+              <a:rPr lang="en-US" baseline="0" dirty="0" smtClean="0"/>
+              <a:t> </a:t>
+            </a:r>
+            <a:r>
+              <a:rPr lang="en-US" baseline="0" dirty="0" err="1" smtClean="0"/>
+              <a:t>abot</a:t>
+            </a:r>
+            <a:r>
+              <a:rPr lang="en-US" baseline="0" dirty="0" smtClean="0"/>
+              <a:t> the </a:t>
+            </a:r>
+            <a:r>
+              <a:rPr lang="en-US" baseline="0" dirty="0" err="1" smtClean="0"/>
+              <a:t>Ui</a:t>
+            </a:r>
+            <a:r>
+              <a:rPr lang="en-US" baseline="0" dirty="0" smtClean="0"/>
+              <a:t> first and sketched a couple of wireframes of what I thought my app might look like.</a:t>
+            </a:r>
+          </a:p>
+          <a:p>
+            <a:endParaRPr lang="en-US" baseline="0" dirty="0" smtClean="0"/>
+          </a:p>
+          <a:p>
+            <a:r>
+              <a:rPr lang="en-US" baseline="0" dirty="0" smtClean="0"/>
+              <a:t>- I kept it really simple and designed just 2 activities and not a lot of user interaction as it specified on the brief that it wasn't necessary.</a:t>
+            </a:r>
+            <a:endParaRPr lang="en-US" dirty="0"/>
+          </a:p>
+        </p:txBody>
+      </p:sp>
+      <p:sp>
+        <p:nvSpPr>
+          <p:cNvPr id="4" name="Slide Number Placeholder 3"/>
+          <p:cNvSpPr>
+            <a:spLocks noGrp="1"/>
+          </p:cNvSpPr>
+          <p:nvPr>
+            <p:ph type="sldNum" sz="quarter" idx="10"/>
+          </p:nvPr>
+        </p:nvSpPr>
+        <p:spPr/>
+        <p:txBody>
+          <a:bodyPr/>
+          <a:lstStyle/>
+          <a:p>
+            <a:fld id="{605307A0-C806-7944-8A93-6CB5551D8580}" type="slidenum">
+              <a:rPr lang="en-US" smtClean="0"/>
+              <a:t>4</a:t>
+            </a:fld>
+            <a:endParaRPr lang="en-US"/>
+          </a:p>
+        </p:txBody>
+      </p:sp>
+    </p:spTree>
+    <p:extLst>
+      <p:ext uri="{BB962C8B-B14F-4D97-AF65-F5344CB8AC3E}">
+        <p14:creationId xmlns:p14="http://schemas.microsoft.com/office/powerpoint/2010/main" val="1158714737"/>
+      </p:ext>
+    </p:extLst>
+  </p:cSld>
+  <p:clrMapOvr>
+    <a:masterClrMapping/>
+  </p:clrMapOvr>
+</p:notes>
+</file>
+
+<file path=ppt/notesSlides/notesSlide4.xml><?xml version="1.0" encoding="utf-8"?>
+<p:notes xmlns:a="http://schemas.openxmlformats.org/drawingml/2006/main" xmlns:r="http://schemas.openxmlformats.org/officeDocument/2006/relationships" xmlns:p="http://schemas.openxmlformats.org/presentationml/2006/main">
+  <p:cSld>
+    <p:spTree>
+      <p:nvGrpSpPr>
+        <p:cNvPr id="1" name=""/>
+        <p:cNvGrpSpPr/>
+        <p:nvPr/>
+      </p:nvGrpSpPr>
+      <p:grpSpPr>
+        <a:xfrm>
+          <a:off x="0" y="0"/>
+          <a:ext cx="0" cy="0"/>
+          <a:chOff x="0" y="0"/>
+          <a:chExt cx="0" cy="0"/>
+        </a:xfrm>
+      </p:grpSpPr>
+      <p:sp>
+        <p:nvSpPr>
+          <p:cNvPr id="2" name="Slide Image Placeholder 1"/>
+          <p:cNvSpPr>
+            <a:spLocks noGrp="1" noRot="1" noChangeAspect="1"/>
+          </p:cNvSpPr>
+          <p:nvPr>
+            <p:ph type="sldImg"/>
+          </p:nvPr>
+        </p:nvSpPr>
+        <p:spPr/>
+      </p:sp>
+      <p:sp>
+        <p:nvSpPr>
+          <p:cNvPr id="3" name="Notes Placeholder 2"/>
+          <p:cNvSpPr>
+            <a:spLocks noGrp="1"/>
+          </p:cNvSpPr>
+          <p:nvPr>
+            <p:ph type="body" idx="1"/>
+          </p:nvPr>
+        </p:nvSpPr>
+        <p:spPr/>
+        <p:txBody>
+          <a:bodyPr/>
+          <a:lstStyle/>
+          <a:p>
+            <a:r>
+              <a:rPr lang="en-US" dirty="0" smtClean="0"/>
+              <a:t>- I then thought about the class diagram and quickly noted what I thought the structure would look like.</a:t>
+            </a:r>
+          </a:p>
+          <a:p>
+            <a:endParaRPr lang="en-US" dirty="0" smtClean="0"/>
+          </a:p>
+          <a:p>
+            <a:r>
+              <a:rPr lang="en-US" dirty="0" smtClean="0"/>
+              <a:t>- I had a card class made of of 2 </a:t>
+            </a:r>
+            <a:r>
+              <a:rPr lang="en-US" dirty="0" err="1" smtClean="0"/>
+              <a:t>enums</a:t>
+            </a:r>
+            <a:r>
+              <a:rPr lang="en-US" dirty="0" smtClean="0"/>
+              <a:t>, suit and value.</a:t>
+            </a:r>
+          </a:p>
+          <a:p>
+            <a:endParaRPr lang="en-US" dirty="0" smtClean="0"/>
+          </a:p>
+          <a:p>
+            <a:r>
+              <a:rPr lang="en-US" dirty="0" smtClean="0"/>
+              <a:t>- A dealer interface which had a random dealer and a test dealer so I wouldn't have to TDD random</a:t>
+            </a:r>
+          </a:p>
+          <a:p>
+            <a:endParaRPr lang="en-US" dirty="0" smtClean="0"/>
+          </a:p>
+          <a:p>
+            <a:r>
+              <a:rPr lang="en-US" dirty="0" smtClean="0"/>
+              <a:t>- I then had a class of Game which took in Playable Player and also a Scorer method.</a:t>
+            </a:r>
+          </a:p>
+          <a:p>
+            <a:endParaRPr lang="en-US" dirty="0" smtClean="0"/>
+          </a:p>
+          <a:p>
+            <a:r>
+              <a:rPr lang="en-US" dirty="0" smtClean="0"/>
+              <a:t>- I discussed the plan with one of the instructors who suggested simplifying</a:t>
+            </a:r>
+            <a:r>
+              <a:rPr lang="en-US" baseline="0" dirty="0" smtClean="0"/>
+              <a:t> things until the basics were up and running.  You can see that I removed quite a few of the classes.</a:t>
+            </a:r>
+            <a:endParaRPr lang="en-US" dirty="0"/>
+          </a:p>
+        </p:txBody>
+      </p:sp>
+      <p:sp>
+        <p:nvSpPr>
+          <p:cNvPr id="4" name="Slide Number Placeholder 3"/>
+          <p:cNvSpPr>
+            <a:spLocks noGrp="1"/>
+          </p:cNvSpPr>
+          <p:nvPr>
+            <p:ph type="sldNum" sz="quarter" idx="10"/>
+          </p:nvPr>
+        </p:nvSpPr>
+        <p:spPr/>
+        <p:txBody>
+          <a:bodyPr/>
+          <a:lstStyle/>
+          <a:p>
+            <a:fld id="{605307A0-C806-7944-8A93-6CB5551D8580}" type="slidenum">
+              <a:rPr lang="en-US" smtClean="0"/>
+              <a:t>5</a:t>
+            </a:fld>
+            <a:endParaRPr lang="en-US"/>
+          </a:p>
+        </p:txBody>
+      </p:sp>
+    </p:spTree>
+    <p:extLst>
+      <p:ext uri="{BB962C8B-B14F-4D97-AF65-F5344CB8AC3E}">
+        <p14:creationId xmlns:p14="http://schemas.microsoft.com/office/powerpoint/2010/main" val="1069013724"/>
+      </p:ext>
+    </p:extLst>
+  </p:cSld>
+  <p:clrMapOvr>
+    <a:masterClrMapping/>
+  </p:clrMapOvr>
+</p:notes>
+</file>
+
+<file path=ppt/notesSlides/notesSlide5.xml><?xml version="1.0" encoding="utf-8"?>
+<p:notes xmlns:a="http://schemas.openxmlformats.org/drawingml/2006/main" xmlns:r="http://schemas.openxmlformats.org/officeDocument/2006/relationships" xmlns:p="http://schemas.openxmlformats.org/presentationml/2006/main">
+  <p:cSld>
+    <p:spTree>
+      <p:nvGrpSpPr>
+        <p:cNvPr id="1" name=""/>
+        <p:cNvGrpSpPr/>
+        <p:nvPr/>
+      </p:nvGrpSpPr>
+      <p:grpSpPr>
+        <a:xfrm>
+          <a:off x="0" y="0"/>
+          <a:ext cx="0" cy="0"/>
+          <a:chOff x="0" y="0"/>
+          <a:chExt cx="0" cy="0"/>
+        </a:xfrm>
+      </p:grpSpPr>
+      <p:sp>
+        <p:nvSpPr>
+          <p:cNvPr id="2" name="Slide Image Placeholder 1"/>
+          <p:cNvSpPr>
+            <a:spLocks noGrp="1" noRot="1" noChangeAspect="1"/>
+          </p:cNvSpPr>
+          <p:nvPr>
+            <p:ph type="sldImg"/>
+          </p:nvPr>
+        </p:nvSpPr>
+        <p:spPr/>
+      </p:sp>
+      <p:sp>
+        <p:nvSpPr>
+          <p:cNvPr id="3" name="Notes Placeholder 2"/>
+          <p:cNvSpPr>
+            <a:spLocks noGrp="1"/>
+          </p:cNvSpPr>
+          <p:nvPr>
+            <p:ph type="body" idx="1"/>
+          </p:nvPr>
+        </p:nvSpPr>
+        <p:spPr/>
+        <p:txBody>
+          <a:bodyPr/>
+          <a:lstStyle/>
+          <a:p>
+            <a:r>
+              <a:rPr lang="en-US" dirty="0" smtClean="0"/>
+              <a:t>- I then completed a full class diagram which was similar but included a Game superclass which was extended by </a:t>
+            </a:r>
+            <a:r>
+              <a:rPr lang="en-US" dirty="0" err="1" smtClean="0"/>
+              <a:t>blackJackGame</a:t>
+            </a:r>
+            <a:r>
+              <a:rPr lang="en-US" dirty="0" smtClean="0"/>
+              <a:t>.</a:t>
+            </a:r>
+          </a:p>
+          <a:p>
+            <a:endParaRPr lang="en-US" dirty="0" smtClean="0"/>
+          </a:p>
+          <a:p>
+            <a:r>
+              <a:rPr lang="en-US" dirty="0" smtClean="0"/>
+              <a:t>-I used the superclass and 2 interfaces to keep the structure as SOLID as possible.</a:t>
+            </a:r>
+          </a:p>
+          <a:p>
+            <a:endParaRPr lang="en-US" dirty="0" smtClean="0"/>
+          </a:p>
+          <a:p>
+            <a:r>
+              <a:rPr lang="en-US" dirty="0" smtClean="0"/>
+              <a:t>-Once I had all these classes and methods</a:t>
+            </a:r>
+            <a:r>
+              <a:rPr lang="en-US" baseline="0" dirty="0" smtClean="0"/>
+              <a:t> in place and a basic user interface, I was keen to add to my app and wanted to put in an additional game.  As I had kept everything quite separate, I was able to add a second game without too much extra work</a:t>
+            </a:r>
+            <a:endParaRPr lang="en-US" dirty="0" smtClean="0"/>
+          </a:p>
+          <a:p>
+            <a:endParaRPr lang="en-US" dirty="0" smtClean="0"/>
+          </a:p>
+          <a:p>
+            <a:endParaRPr lang="en-US" dirty="0"/>
+          </a:p>
+        </p:txBody>
+      </p:sp>
+      <p:sp>
+        <p:nvSpPr>
+          <p:cNvPr id="4" name="Slide Number Placeholder 3"/>
+          <p:cNvSpPr>
+            <a:spLocks noGrp="1"/>
+          </p:cNvSpPr>
+          <p:nvPr>
+            <p:ph type="sldNum" sz="quarter" idx="10"/>
+          </p:nvPr>
+        </p:nvSpPr>
+        <p:spPr/>
+        <p:txBody>
+          <a:bodyPr/>
+          <a:lstStyle/>
+          <a:p>
+            <a:fld id="{605307A0-C806-7944-8A93-6CB5551D8580}" type="slidenum">
+              <a:rPr lang="en-US" smtClean="0"/>
+              <a:t>6</a:t>
+            </a:fld>
+            <a:endParaRPr lang="en-US"/>
+          </a:p>
+        </p:txBody>
+      </p:sp>
+    </p:spTree>
+    <p:extLst>
+      <p:ext uri="{BB962C8B-B14F-4D97-AF65-F5344CB8AC3E}">
+        <p14:creationId xmlns:p14="http://schemas.microsoft.com/office/powerpoint/2010/main" val="1145569490"/>
+      </p:ext>
+    </p:extLst>
+  </p:cSld>
+  <p:clrMapOvr>
+    <a:masterClrMapping/>
+  </p:clrMapOvr>
+</p:notes>
+</file>
+
+<file path=ppt/notesSlides/notesSlide6.xml><?xml version="1.0" encoding="utf-8"?>
+<p:notes xmlns:a="http://schemas.openxmlformats.org/drawingml/2006/main" xmlns:r="http://schemas.openxmlformats.org/officeDocument/2006/relationships" xmlns:p="http://schemas.openxmlformats.org/presentationml/2006/main">
+  <p:cSld>
+    <p:spTree>
+      <p:nvGrpSpPr>
+        <p:cNvPr id="1" name=""/>
+        <p:cNvGrpSpPr/>
+        <p:nvPr/>
+      </p:nvGrpSpPr>
+      <p:grpSpPr>
+        <a:xfrm>
+          <a:off x="0" y="0"/>
+          <a:ext cx="0" cy="0"/>
+          <a:chOff x="0" y="0"/>
+          <a:chExt cx="0" cy="0"/>
+        </a:xfrm>
+      </p:grpSpPr>
+      <p:sp>
+        <p:nvSpPr>
+          <p:cNvPr id="2" name="Slide Image Placeholder 1"/>
+          <p:cNvSpPr>
+            <a:spLocks noGrp="1" noRot="1" noChangeAspect="1"/>
+          </p:cNvSpPr>
+          <p:nvPr>
+            <p:ph type="sldImg"/>
+          </p:nvPr>
+        </p:nvSpPr>
+        <p:spPr/>
+      </p:sp>
+      <p:sp>
+        <p:nvSpPr>
+          <p:cNvPr id="3" name="Notes Placeholder 2"/>
+          <p:cNvSpPr>
+            <a:spLocks noGrp="1"/>
+          </p:cNvSpPr>
+          <p:nvPr>
+            <p:ph type="body" idx="1"/>
+          </p:nvPr>
+        </p:nvSpPr>
+        <p:spPr/>
+        <p:txBody>
+          <a:bodyPr/>
+          <a:lstStyle/>
+          <a:p>
+            <a:r>
+              <a:rPr lang="en-US" dirty="0" smtClean="0"/>
+              <a:t>I added in highest card and only had to add an additional 2 classes</a:t>
+            </a:r>
+            <a:r>
+              <a:rPr lang="en-US" baseline="0" dirty="0" smtClean="0"/>
+              <a:t> to make it work - </a:t>
+            </a:r>
+            <a:r>
+              <a:rPr lang="en-US" baseline="0" dirty="0" err="1" smtClean="0"/>
+              <a:t>HighestCardGame</a:t>
+            </a:r>
+            <a:r>
+              <a:rPr lang="en-US" baseline="0" dirty="0" smtClean="0"/>
+              <a:t> which extends Game, and </a:t>
+            </a:r>
+            <a:r>
+              <a:rPr lang="en-US" baseline="0" dirty="0" err="1" smtClean="0"/>
+              <a:t>highestCardPlayer</a:t>
+            </a:r>
+            <a:r>
+              <a:rPr lang="en-US" baseline="0" dirty="0" smtClean="0"/>
+              <a:t> which implements Playable</a:t>
+            </a:r>
+          </a:p>
+          <a:p>
+            <a:endParaRPr lang="en-US" baseline="0" dirty="0" smtClean="0"/>
+          </a:p>
+          <a:p>
+            <a:r>
+              <a:rPr lang="en-US" baseline="0" dirty="0" smtClean="0"/>
+              <a:t>- the most time consuming part of adding the extra game was adding the extra </a:t>
+            </a:r>
+            <a:r>
+              <a:rPr lang="en-US" baseline="0" dirty="0" err="1" smtClean="0"/>
+              <a:t>activties</a:t>
+            </a:r>
+            <a:r>
+              <a:rPr lang="en-US" baseline="0" dirty="0" smtClean="0"/>
+              <a:t> which I can show you now</a:t>
+            </a:r>
+            <a:endParaRPr lang="en-US" dirty="0"/>
+          </a:p>
+        </p:txBody>
+      </p:sp>
+      <p:sp>
+        <p:nvSpPr>
+          <p:cNvPr id="4" name="Slide Number Placeholder 3"/>
+          <p:cNvSpPr>
+            <a:spLocks noGrp="1"/>
+          </p:cNvSpPr>
+          <p:nvPr>
+            <p:ph type="sldNum" sz="quarter" idx="10"/>
+          </p:nvPr>
+        </p:nvSpPr>
+        <p:spPr/>
+        <p:txBody>
+          <a:bodyPr/>
+          <a:lstStyle/>
+          <a:p>
+            <a:fld id="{605307A0-C806-7944-8A93-6CB5551D8580}" type="slidenum">
+              <a:rPr lang="en-US" smtClean="0"/>
+              <a:t>7</a:t>
+            </a:fld>
+            <a:endParaRPr lang="en-US"/>
+          </a:p>
+        </p:txBody>
+      </p:sp>
+    </p:spTree>
+    <p:extLst>
+      <p:ext uri="{BB962C8B-B14F-4D97-AF65-F5344CB8AC3E}">
+        <p14:creationId xmlns:p14="http://schemas.microsoft.com/office/powerpoint/2010/main" val="1114179962"/>
+      </p:ext>
+    </p:extLst>
+  </p:cSld>
+  <p:clrMapOvr>
+    <a:masterClrMapping/>
+  </p:clrMapOvr>
+</p:notes>
+</file>
+
+<file path=ppt/notesSlides/notesSlide7.xml><?xml version="1.0" encoding="utf-8"?>
+<p:notes xmlns:a="http://schemas.openxmlformats.org/drawingml/2006/main" xmlns:r="http://schemas.openxmlformats.org/officeDocument/2006/relationships" xmlns:p="http://schemas.openxmlformats.org/presentationml/2006/main">
+  <p:cSld>
+    <p:spTree>
+      <p:nvGrpSpPr>
+        <p:cNvPr id="1" name=""/>
+        <p:cNvGrpSpPr/>
+        <p:nvPr/>
+      </p:nvGrpSpPr>
+      <p:grpSpPr>
+        <a:xfrm>
+          <a:off x="0" y="0"/>
+          <a:ext cx="0" cy="0"/>
+          <a:chOff x="0" y="0"/>
+          <a:chExt cx="0" cy="0"/>
+        </a:xfrm>
+      </p:grpSpPr>
+      <p:sp>
+        <p:nvSpPr>
+          <p:cNvPr id="2" name="Slide Image Placeholder 1"/>
+          <p:cNvSpPr>
+            <a:spLocks noGrp="1" noRot="1" noChangeAspect="1"/>
+          </p:cNvSpPr>
+          <p:nvPr>
+            <p:ph type="sldImg"/>
+          </p:nvPr>
+        </p:nvSpPr>
+        <p:spPr/>
+      </p:sp>
+      <p:sp>
+        <p:nvSpPr>
+          <p:cNvPr id="3" name="Notes Placeholder 2"/>
+          <p:cNvSpPr>
+            <a:spLocks noGrp="1"/>
+          </p:cNvSpPr>
+          <p:nvPr>
+            <p:ph type="body" idx="1"/>
+          </p:nvPr>
+        </p:nvSpPr>
+        <p:spPr/>
+        <p:txBody>
+          <a:bodyPr/>
+          <a:lstStyle/>
+          <a:p>
+            <a:r>
+              <a:rPr lang="en-US" dirty="0" smtClean="0"/>
+              <a:t>- I don't</a:t>
+            </a:r>
+            <a:r>
+              <a:rPr lang="en-US" baseline="0" dirty="0" smtClean="0"/>
+              <a:t> have a particular piece of code which I would call my favorite.  I'm really happy at the amount of logic I have managed to put into the games and show on the UI.</a:t>
+            </a:r>
+          </a:p>
+          <a:p>
+            <a:endParaRPr lang="en-US" baseline="0" dirty="0" smtClean="0"/>
+          </a:p>
+          <a:p>
+            <a:r>
+              <a:rPr lang="en-US" baseline="0" dirty="0" smtClean="0"/>
+              <a:t>- I did have to ask for help with many of the methods after trying to implement them myself and found that I was usually almost there which was frustrating but also quite encouraging that I seemed to be grasping what needed to happen even if I couldn't always implement it exactly right</a:t>
+            </a:r>
+          </a:p>
+          <a:p>
+            <a:endParaRPr lang="en-US" baseline="0" dirty="0" smtClean="0"/>
+          </a:p>
+          <a:p>
+            <a:r>
+              <a:rPr lang="en-US" baseline="0" dirty="0" smtClean="0"/>
+              <a:t>- </a:t>
+            </a:r>
+            <a:r>
+              <a:rPr lang="en-US" baseline="0" dirty="0" err="1" smtClean="0"/>
+              <a:t>i</a:t>
+            </a:r>
+            <a:r>
+              <a:rPr lang="en-US" baseline="0" dirty="0" smtClean="0"/>
+              <a:t> have put in this piece of code which determines if a player has </a:t>
+            </a:r>
+            <a:r>
+              <a:rPr lang="en-US" baseline="0" dirty="0" err="1" smtClean="0"/>
+              <a:t>blackJack</a:t>
+            </a:r>
+            <a:r>
+              <a:rPr lang="en-US" baseline="0" dirty="0" smtClean="0"/>
+              <a:t>.  It loops through the players hand and checks to see if they have an ace and the have a card with a value of 10 or more.  If both conditions are true then a winner is declared.</a:t>
+            </a:r>
+            <a:endParaRPr lang="en-US" dirty="0"/>
+          </a:p>
+        </p:txBody>
+      </p:sp>
+      <p:sp>
+        <p:nvSpPr>
+          <p:cNvPr id="4" name="Slide Number Placeholder 3"/>
+          <p:cNvSpPr>
+            <a:spLocks noGrp="1"/>
+          </p:cNvSpPr>
+          <p:nvPr>
+            <p:ph type="sldNum" sz="quarter" idx="10"/>
+          </p:nvPr>
+        </p:nvSpPr>
+        <p:spPr/>
+        <p:txBody>
+          <a:bodyPr/>
+          <a:lstStyle/>
+          <a:p>
+            <a:fld id="{605307A0-C806-7944-8A93-6CB5551D8580}" type="slidenum">
+              <a:rPr lang="en-US" smtClean="0"/>
+              <a:t>9</a:t>
+            </a:fld>
+            <a:endParaRPr lang="en-US"/>
+          </a:p>
+        </p:txBody>
+      </p:sp>
+    </p:spTree>
+    <p:extLst>
+      <p:ext uri="{BB962C8B-B14F-4D97-AF65-F5344CB8AC3E}">
+        <p14:creationId xmlns:p14="http://schemas.microsoft.com/office/powerpoint/2010/main" val="2136332304"/>
+      </p:ext>
+    </p:extLst>
+  </p:cSld>
+  <p:clrMapOvr>
+    <a:masterClrMapping/>
+  </p:clrMapOvr>
+</p:notes>
 </file>
 
 <file path=ppt/slideLayouts/slideLayout1.xml><?xml version="1.0" encoding="utf-8"?>
@@ -3348,7 +4196,7 @@
         </p:blipFill>
         <p:spPr>
           <a:xfrm>
-            <a:off x="7827620" y="2514599"/>
+            <a:off x="7593445" y="150541"/>
             <a:ext cx="4170251" cy="4085771"/>
           </a:xfrm>
           <a:prstGeom prst="rect">
@@ -3364,8 +4212,8 @@
         </p:nvSpPr>
         <p:spPr>
           <a:xfrm>
-            <a:off x="402771" y="337457"/>
-            <a:ext cx="7151915" cy="1107996"/>
+            <a:off x="336395" y="3811012"/>
+            <a:ext cx="7826298" cy="3046988"/>
           </a:xfrm>
           <a:prstGeom prst="rect">
             <a:avLst/>
@@ -3379,14 +4227,24 @@
           <a:lstStyle/>
           <a:p>
             <a:r>
-              <a:rPr lang="en-US" sz="6600" b="1" dirty="0" smtClean="0">
+              <a:rPr lang="en-US" sz="9600" smtClean="0">
                 <a:latin typeface="Arial Rounded MT Bold" charset="0"/>
                 <a:ea typeface="Arial Rounded MT Bold" charset="0"/>
                 <a:cs typeface="Arial Rounded MT Bold" charset="0"/>
               </a:rPr>
-              <a:t>Card Game App</a:t>
-            </a:r>
-            <a:endParaRPr lang="en-US" sz="6600" b="1" dirty="0">
+              <a:t>JAVA </a:t>
+            </a:r>
+          </a:p>
+          <a:p>
+            <a:r>
+              <a:rPr lang="en-US" sz="9600" dirty="0" smtClean="0">
+                <a:latin typeface="Arial Rounded MT Bold" charset="0"/>
+                <a:ea typeface="Arial Rounded MT Bold" charset="0"/>
+                <a:cs typeface="Arial Rounded MT Bold" charset="0"/>
+              </a:rPr>
+              <a:t>CARD GAME</a:t>
+            </a:r>
+            <a:endParaRPr lang="en-US" sz="9600" dirty="0">
               <a:latin typeface="Arial Rounded MT Bold" charset="0"/>
               <a:ea typeface="Arial Rounded MT Bold" charset="0"/>
               <a:cs typeface="Arial Rounded MT Bold" charset="0"/>
@@ -3394,70 +4252,10 @@
           </a:p>
         </p:txBody>
       </p:sp>
-      <p:sp>
-        <p:nvSpPr>
-          <p:cNvPr id="6" name="TextBox 5"/>
-          <p:cNvSpPr txBox="1"/>
-          <p:nvPr/>
-        </p:nvSpPr>
-        <p:spPr>
-          <a:xfrm>
-            <a:off x="642257" y="2002972"/>
-            <a:ext cx="6291943" cy="4031873"/>
-          </a:xfrm>
-          <a:prstGeom prst="rect">
-            <a:avLst/>
-          </a:prstGeom>
-          <a:noFill/>
-        </p:spPr>
-        <p:txBody>
-          <a:bodyPr wrap="square" rtlCol="0">
-            <a:spAutoFit/>
-          </a:bodyPr>
-          <a:lstStyle/>
-          <a:p>
-            <a:r>
-              <a:rPr lang="en-US" sz="3200" dirty="0" smtClean="0">
-                <a:latin typeface="Arial Rounded MT Bold" charset="0"/>
-                <a:ea typeface="Arial Rounded MT Bold" charset="0"/>
-                <a:cs typeface="Arial Rounded MT Bold" charset="0"/>
-              </a:rPr>
-              <a:t>I wanted to tackle a project which included a user interface</a:t>
-            </a:r>
-          </a:p>
-          <a:p>
-            <a:r>
-              <a:rPr lang="en-US" sz="3200" dirty="0" smtClean="0">
-                <a:latin typeface="Arial Rounded MT Bold" charset="0"/>
-                <a:ea typeface="Arial Rounded MT Bold" charset="0"/>
-                <a:cs typeface="Arial Rounded MT Bold" charset="0"/>
-              </a:rPr>
-              <a:t> </a:t>
-            </a:r>
-          </a:p>
-          <a:p>
-            <a:endParaRPr lang="en-US" sz="3200" dirty="0">
-              <a:latin typeface="Arial Rounded MT Bold" charset="0"/>
-              <a:ea typeface="Arial Rounded MT Bold" charset="0"/>
-              <a:cs typeface="Arial Rounded MT Bold" charset="0"/>
-            </a:endParaRPr>
-          </a:p>
-          <a:p>
-            <a:r>
-              <a:rPr lang="en-US" sz="3200" dirty="0" smtClean="0">
-                <a:latin typeface="Arial Rounded MT Bold" charset="0"/>
-                <a:ea typeface="Arial Rounded MT Bold" charset="0"/>
-                <a:cs typeface="Arial Rounded MT Bold" charset="0"/>
-              </a:rPr>
-              <a:t> I have previously struggled with game logic and wanted to challenge myself</a:t>
-            </a:r>
-          </a:p>
-        </p:txBody>
-      </p:sp>
     </p:spTree>
     <p:extLst>
       <p:ext uri="{BB962C8B-B14F-4D97-AF65-F5344CB8AC3E}">
-        <p14:creationId xmlns:p14="http://schemas.microsoft.com/office/powerpoint/2010/main" val="492259997"/>
+        <p14:creationId xmlns:p14="http://schemas.microsoft.com/office/powerpoint/2010/main" val="1514638111"/>
       </p:ext>
     </p:extLst>
   </p:cSld>
@@ -3475,6 +4273,259 @@
 </file>
 
 <file path=ppt/slides/slide10.xml><?xml version="1.0" encoding="utf-8"?>
+<p:sld xmlns:a="http://schemas.openxmlformats.org/drawingml/2006/main" xmlns:r="http://schemas.openxmlformats.org/officeDocument/2006/relationships" xmlns:p="http://schemas.openxmlformats.org/presentationml/2006/main">
+  <p:cSld>
+    <p:spTree>
+      <p:nvGrpSpPr>
+        <p:cNvPr id="1" name=""/>
+        <p:cNvGrpSpPr/>
+        <p:nvPr/>
+      </p:nvGrpSpPr>
+      <p:grpSpPr>
+        <a:xfrm>
+          <a:off x="0" y="0"/>
+          <a:ext cx="0" cy="0"/>
+          <a:chOff x="0" y="0"/>
+          <a:chExt cx="0" cy="0"/>
+        </a:xfrm>
+      </p:grpSpPr>
+      <p:sp>
+        <p:nvSpPr>
+          <p:cNvPr id="4" name="TextBox 3"/>
+          <p:cNvSpPr txBox="1"/>
+          <p:nvPr/>
+        </p:nvSpPr>
+        <p:spPr>
+          <a:xfrm>
+            <a:off x="600075" y="314325"/>
+            <a:ext cx="9915525" cy="4893647"/>
+          </a:xfrm>
+          <a:prstGeom prst="rect">
+            <a:avLst/>
+          </a:prstGeom>
+          <a:noFill/>
+        </p:spPr>
+        <p:txBody>
+          <a:bodyPr wrap="square" rtlCol="0">
+            <a:spAutoFit/>
+          </a:bodyPr>
+          <a:lstStyle/>
+          <a:p>
+            <a:r>
+              <a:rPr lang="en-US" sz="6000" dirty="0" smtClean="0">
+                <a:latin typeface="Arial Rounded MT Bold" charset="0"/>
+                <a:ea typeface="Arial Rounded MT Bold" charset="0"/>
+                <a:cs typeface="Arial Rounded MT Bold" charset="0"/>
+              </a:rPr>
+              <a:t>My Learning Points</a:t>
+            </a:r>
+            <a:r>
+              <a:rPr lang="mr-IN" sz="6000" dirty="0" smtClean="0">
+                <a:latin typeface="Arial Rounded MT Bold" charset="0"/>
+                <a:ea typeface="Arial Rounded MT Bold" charset="0"/>
+                <a:cs typeface="Arial Rounded MT Bold" charset="0"/>
+              </a:rPr>
+              <a:t>…</a:t>
+            </a:r>
+            <a:endParaRPr lang="en-GB" sz="6000" dirty="0" smtClean="0">
+              <a:latin typeface="Arial Rounded MT Bold" charset="0"/>
+              <a:ea typeface="Arial Rounded MT Bold" charset="0"/>
+              <a:cs typeface="Arial Rounded MT Bold" charset="0"/>
+            </a:endParaRPr>
+          </a:p>
+          <a:p>
+            <a:endParaRPr lang="en-GB" sz="6000" dirty="0">
+              <a:latin typeface="Arial Rounded MT Bold" charset="0"/>
+              <a:ea typeface="Arial Rounded MT Bold" charset="0"/>
+              <a:cs typeface="Arial Rounded MT Bold" charset="0"/>
+            </a:endParaRPr>
+          </a:p>
+          <a:p>
+            <a:pPr marL="342900" indent="-342900">
+              <a:buFont typeface="Wingdings" charset="2"/>
+              <a:buChar char="ü"/>
+            </a:pPr>
+            <a:r>
+              <a:rPr lang="en-GB" sz="2400" dirty="0" smtClean="0">
+                <a:latin typeface="Arial Rounded MT Bold" charset="0"/>
+                <a:ea typeface="Arial Rounded MT Bold" charset="0"/>
+                <a:cs typeface="Arial Rounded MT Bold" charset="0"/>
+              </a:rPr>
+              <a:t>I need to make better use of planning aides(</a:t>
+            </a:r>
+            <a:r>
+              <a:rPr lang="en-GB" sz="2400" dirty="0" err="1" smtClean="0">
+                <a:latin typeface="Arial Rounded MT Bold" charset="0"/>
+                <a:ea typeface="Arial Rounded MT Bold" charset="0"/>
+                <a:cs typeface="Arial Rounded MT Bold" charset="0"/>
+              </a:rPr>
+              <a:t>eg</a:t>
+            </a:r>
+            <a:r>
+              <a:rPr lang="en-GB" sz="2400" dirty="0" smtClean="0">
+                <a:latin typeface="Arial Rounded MT Bold" charset="0"/>
+                <a:ea typeface="Arial Rounded MT Bold" charset="0"/>
+                <a:cs typeface="Arial Rounded MT Bold" charset="0"/>
+              </a:rPr>
+              <a:t> Trello)</a:t>
+            </a:r>
+            <a:endParaRPr lang="en-GB" sz="2400" dirty="0" smtClean="0">
+              <a:latin typeface="Arial Rounded MT Bold" charset="0"/>
+              <a:ea typeface="Arial Rounded MT Bold" charset="0"/>
+              <a:cs typeface="Arial Rounded MT Bold" charset="0"/>
+            </a:endParaRPr>
+          </a:p>
+          <a:p>
+            <a:pPr marL="342900" indent="-342900">
+              <a:buFont typeface="Wingdings" charset="2"/>
+              <a:buChar char="ü"/>
+            </a:pPr>
+            <a:endParaRPr lang="en-GB" sz="2400" dirty="0">
+              <a:latin typeface="Arial Rounded MT Bold" charset="0"/>
+              <a:ea typeface="Arial Rounded MT Bold" charset="0"/>
+              <a:cs typeface="Arial Rounded MT Bold" charset="0"/>
+            </a:endParaRPr>
+          </a:p>
+          <a:p>
+            <a:pPr marL="342900" indent="-342900">
+              <a:buFont typeface="Wingdings" charset="2"/>
+              <a:buChar char="ü"/>
+            </a:pPr>
+            <a:r>
+              <a:rPr lang="en-GB" sz="2400" dirty="0" smtClean="0">
+                <a:latin typeface="Arial Rounded MT Bold" charset="0"/>
+                <a:ea typeface="Arial Rounded MT Bold" charset="0"/>
+                <a:cs typeface="Arial Rounded MT Bold" charset="0"/>
+              </a:rPr>
+              <a:t>I have written so many loops I think I now know what loops do!</a:t>
+            </a:r>
+          </a:p>
+          <a:p>
+            <a:pPr marL="342900" indent="-342900">
+              <a:buFont typeface="Wingdings" charset="2"/>
+              <a:buChar char="ü"/>
+            </a:pPr>
+            <a:endParaRPr lang="en-GB" sz="2400" dirty="0">
+              <a:latin typeface="Arial Rounded MT Bold" charset="0"/>
+              <a:ea typeface="Arial Rounded MT Bold" charset="0"/>
+              <a:cs typeface="Arial Rounded MT Bold" charset="0"/>
+            </a:endParaRPr>
+          </a:p>
+          <a:p>
+            <a:pPr marL="342900" indent="-342900">
+              <a:buFont typeface="Wingdings" charset="2"/>
+              <a:buChar char="ü"/>
+            </a:pPr>
+            <a:r>
+              <a:rPr lang="en-GB" sz="2400" dirty="0" smtClean="0">
+                <a:latin typeface="Arial Rounded MT Bold" charset="0"/>
+                <a:ea typeface="Arial Rounded MT Bold" charset="0"/>
+                <a:cs typeface="Arial Rounded MT Bold" charset="0"/>
+              </a:rPr>
+              <a:t>I feel I now have a better understanding of SOLID principles</a:t>
+            </a:r>
+          </a:p>
+          <a:p>
+            <a:pPr marL="342900" indent="-342900">
+              <a:buFont typeface="Wingdings" charset="2"/>
+              <a:buChar char="ü"/>
+            </a:pPr>
+            <a:endParaRPr lang="en-GB" sz="2400" dirty="0">
+              <a:latin typeface="Arial Rounded MT Bold" charset="0"/>
+              <a:ea typeface="Arial Rounded MT Bold" charset="0"/>
+              <a:cs typeface="Arial Rounded MT Bold" charset="0"/>
+            </a:endParaRPr>
+          </a:p>
+          <a:p>
+            <a:pPr marL="342900" indent="-342900">
+              <a:buFont typeface="Wingdings" charset="2"/>
+              <a:buChar char="ü"/>
+            </a:pPr>
+            <a:r>
+              <a:rPr lang="en-GB" sz="2400" dirty="0" smtClean="0">
+                <a:latin typeface="Arial Rounded MT Bold" charset="0"/>
+                <a:ea typeface="Arial Rounded MT Bold" charset="0"/>
+                <a:cs typeface="Arial Rounded MT Bold" charset="0"/>
+              </a:rPr>
+              <a:t>Refactoring is hard </a:t>
+            </a:r>
+            <a:r>
+              <a:rPr lang="mr-IN" sz="2400" dirty="0" smtClean="0">
+                <a:latin typeface="Arial Rounded MT Bold" charset="0"/>
+                <a:ea typeface="Arial Rounded MT Bold" charset="0"/>
+                <a:cs typeface="Arial Rounded MT Bold" charset="0"/>
+              </a:rPr>
+              <a:t>–</a:t>
+            </a:r>
+            <a:r>
+              <a:rPr lang="en-GB" sz="2400" dirty="0" smtClean="0">
+                <a:latin typeface="Arial Rounded MT Bold" charset="0"/>
+                <a:ea typeface="Arial Rounded MT Bold" charset="0"/>
+                <a:cs typeface="Arial Rounded MT Bold" charset="0"/>
+              </a:rPr>
+              <a:t> try to get things in the right place first time</a:t>
+            </a:r>
+          </a:p>
+          <a:p>
+            <a:endParaRPr lang="en-GB" sz="2400" dirty="0">
+              <a:latin typeface="Arial Rounded MT Bold" charset="0"/>
+              <a:ea typeface="Arial Rounded MT Bold" charset="0"/>
+              <a:cs typeface="Arial Rounded MT Bold" charset="0"/>
+            </a:endParaRPr>
+          </a:p>
+        </p:txBody>
+      </p:sp>
+      <p:pic>
+        <p:nvPicPr>
+          <p:cNvPr id="5" name="Picture 4"/>
+          <p:cNvPicPr>
+            <a:picLocks noChangeAspect="1"/>
+          </p:cNvPicPr>
+          <p:nvPr/>
+        </p:nvPicPr>
+        <p:blipFill>
+          <a:blip r:embed="rId2">
+            <a:extLst>
+              <a:ext uri="{28A0092B-C50C-407E-A947-70E740481C1C}">
+                <a14:useLocalDpi xmlns:a14="http://schemas.microsoft.com/office/drawing/2010/main" val="0"/>
+              </a:ext>
+            </a:extLst>
+          </a:blip>
+          <a:stretch>
+            <a:fillRect/>
+          </a:stretch>
+        </p:blipFill>
+        <p:spPr>
+          <a:xfrm>
+            <a:off x="10737071" y="108857"/>
+            <a:ext cx="1336999" cy="1309914"/>
+          </a:xfrm>
+          <a:prstGeom prst="rect">
+            <a:avLst/>
+          </a:prstGeom>
+        </p:spPr>
+      </p:pic>
+    </p:spTree>
+    <p:extLst>
+      <p:ext uri="{BB962C8B-B14F-4D97-AF65-F5344CB8AC3E}">
+        <p14:creationId xmlns:p14="http://schemas.microsoft.com/office/powerpoint/2010/main" val="744859990"/>
+      </p:ext>
+    </p:extLst>
+  </p:cSld>
+  <p:clrMapOvr>
+    <a:masterClrMapping/>
+  </p:clrMapOvr>
+  <p:timing>
+    <p:tnLst>
+      <p:par>
+        <p:cTn id="1" dur="indefinite" restart="never" nodeType="tmRoot"/>
+      </p:par>
+    </p:tnLst>
+  </p:timing>
+</p:sld>
+</file>
+
+<file path=ppt/slides/slide11.xml><?xml version="1.0" encoding="utf-8"?>
 <p:sld xmlns:a="http://schemas.openxmlformats.org/drawingml/2006/main" xmlns:r="http://schemas.openxmlformats.org/officeDocument/2006/relationships" xmlns:p="http://schemas.openxmlformats.org/presentationml/2006/main">
   <p:cSld>
     <p:spTree>
@@ -3605,36 +4656,6 @@
           <p:nvPr/>
         </p:nvPicPr>
         <p:blipFill>
-          <a:blip r:embed="rId2">
-            <a:extLst>
-              <a:ext uri="{28A0092B-C50C-407E-A947-70E740481C1C}">
-                <a14:useLocalDpi xmlns:a14="http://schemas.microsoft.com/office/drawing/2010/main" val="0"/>
-              </a:ext>
-            </a:extLst>
-          </a:blip>
-          <a:stretch>
-            <a:fillRect/>
-          </a:stretch>
-        </p:blipFill>
-        <p:spPr>
-          <a:xfrm>
-            <a:off x="2153065" y="714482"/>
-            <a:ext cx="7885870" cy="5429037"/>
-          </a:xfrm>
-          <a:prstGeom prst="rect">
-            <a:avLst/>
-          </a:prstGeom>
-        </p:spPr>
-      </p:pic>
-      <p:pic>
-        <p:nvPicPr>
-          <p:cNvPr id="5" name="Picture 4"/>
-          <p:cNvPicPr>
-            <a:picLocks noChangeAspect="1"/>
-          </p:cNvPicPr>
-          <p:nvPr/>
-        </p:nvPicPr>
-        <p:blipFill>
           <a:blip r:embed="rId3">
             <a:extLst>
               <a:ext uri="{28A0092B-C50C-407E-A947-70E740481C1C}">
@@ -3648,18 +4669,116 @@
         </p:blipFill>
         <p:spPr>
           <a:xfrm>
-            <a:off x="10737071" y="108857"/>
-            <a:ext cx="1336999" cy="1309914"/>
+            <a:off x="7827620" y="2514599"/>
+            <a:ext cx="4170251" cy="4085771"/>
           </a:xfrm>
           <a:prstGeom prst="rect">
             <a:avLst/>
           </a:prstGeom>
         </p:spPr>
       </p:pic>
+      <p:sp>
+        <p:nvSpPr>
+          <p:cNvPr id="5" name="TextBox 4"/>
+          <p:cNvSpPr txBox="1"/>
+          <p:nvPr/>
+        </p:nvSpPr>
+        <p:spPr>
+          <a:xfrm>
+            <a:off x="402771" y="337457"/>
+            <a:ext cx="8953102" cy="1107996"/>
+          </a:xfrm>
+          <a:prstGeom prst="rect">
+            <a:avLst/>
+          </a:prstGeom>
+          <a:noFill/>
+        </p:spPr>
+        <p:txBody>
+          <a:bodyPr wrap="square" rtlCol="0">
+            <a:spAutoFit/>
+          </a:bodyPr>
+          <a:lstStyle/>
+          <a:p>
+            <a:r>
+              <a:rPr lang="en-US" sz="6600" b="1" smtClean="0">
+                <a:latin typeface="Arial Rounded MT Bold" charset="0"/>
+                <a:ea typeface="Arial Rounded MT Bold" charset="0"/>
+                <a:cs typeface="Arial Rounded MT Bold" charset="0"/>
+              </a:rPr>
+              <a:t>Why the Card Game?</a:t>
+            </a:r>
+            <a:endParaRPr lang="en-US" sz="6600" b="1" dirty="0">
+              <a:latin typeface="Arial Rounded MT Bold" charset="0"/>
+              <a:ea typeface="Arial Rounded MT Bold" charset="0"/>
+              <a:cs typeface="Arial Rounded MT Bold" charset="0"/>
+            </a:endParaRPr>
+          </a:p>
+        </p:txBody>
+      </p:sp>
+      <p:sp>
+        <p:nvSpPr>
+          <p:cNvPr id="6" name="TextBox 5"/>
+          <p:cNvSpPr txBox="1"/>
+          <p:nvPr/>
+        </p:nvSpPr>
+        <p:spPr>
+          <a:xfrm>
+            <a:off x="642257" y="2002972"/>
+            <a:ext cx="6291943" cy="4031873"/>
+          </a:xfrm>
+          <a:prstGeom prst="rect">
+            <a:avLst/>
+          </a:prstGeom>
+          <a:noFill/>
+        </p:spPr>
+        <p:txBody>
+          <a:bodyPr wrap="square" rtlCol="0">
+            <a:spAutoFit/>
+          </a:bodyPr>
+          <a:lstStyle/>
+          <a:p>
+            <a:r>
+              <a:rPr lang="en-US" sz="3200" dirty="0" smtClean="0">
+                <a:latin typeface="Arial Rounded MT Bold" charset="0"/>
+                <a:ea typeface="Arial Rounded MT Bold" charset="0"/>
+                <a:cs typeface="Arial Rounded MT Bold" charset="0"/>
+              </a:rPr>
+              <a:t>I wanted to tackle a project which included a user interface</a:t>
+            </a:r>
+          </a:p>
+          <a:p>
+            <a:r>
+              <a:rPr lang="en-US" sz="3200" dirty="0" smtClean="0">
+                <a:latin typeface="Arial Rounded MT Bold" charset="0"/>
+                <a:ea typeface="Arial Rounded MT Bold" charset="0"/>
+                <a:cs typeface="Arial Rounded MT Bold" charset="0"/>
+              </a:rPr>
+              <a:t> </a:t>
+            </a:r>
+          </a:p>
+          <a:p>
+            <a:endParaRPr lang="en-US" sz="3200" dirty="0">
+              <a:latin typeface="Arial Rounded MT Bold" charset="0"/>
+              <a:ea typeface="Arial Rounded MT Bold" charset="0"/>
+              <a:cs typeface="Arial Rounded MT Bold" charset="0"/>
+            </a:endParaRPr>
+          </a:p>
+          <a:p>
+            <a:r>
+              <a:rPr lang="en-US" sz="3200" dirty="0" smtClean="0">
+                <a:latin typeface="Arial Rounded MT Bold" charset="0"/>
+                <a:ea typeface="Arial Rounded MT Bold" charset="0"/>
+                <a:cs typeface="Arial Rounded MT Bold" charset="0"/>
+              </a:rPr>
+              <a:t> I have previously struggled with game logic and wanted to challenge myself</a:t>
+            </a:r>
+          </a:p>
+        </p:txBody>
+      </p:sp>
     </p:spTree>
     <p:extLst>
       <p:ext uri="{BB962C8B-B14F-4D97-AF65-F5344CB8AC3E}">
-        <p14:creationId xmlns:p14="http://schemas.microsoft.com/office/powerpoint/2010/main" val="1509397266"/>
+        <p14:creationId xmlns:p14="http://schemas.microsoft.com/office/powerpoint/2010/main" val="492259997"/>
       </p:ext>
     </p:extLst>
   </p:cSld>
@@ -3702,7 +4821,7 @@
           <p:nvPr/>
         </p:nvPicPr>
         <p:blipFill>
-          <a:blip r:embed="rId2">
+          <a:blip r:embed="rId3">
             <a:extLst>
               <a:ext uri="{28A0092B-C50C-407E-A947-70E740481C1C}">
                 <a14:useLocalDpi xmlns:a14="http://schemas.microsoft.com/office/drawing/2010/main" val="0"/>
@@ -3715,8 +4834,8 @@
         </p:blipFill>
         <p:spPr>
           <a:xfrm>
-            <a:off x="675759" y="250371"/>
-            <a:ext cx="3701285" cy="6346372"/>
+            <a:off x="2153065" y="714482"/>
+            <a:ext cx="7885870" cy="5429037"/>
           </a:xfrm>
           <a:prstGeom prst="rect">
             <a:avLst/>
@@ -3732,7 +4851,7 @@
           <p:nvPr/>
         </p:nvPicPr>
         <p:blipFill>
-          <a:blip r:embed="rId3">
+          <a:blip r:embed="rId4">
             <a:extLst>
               <a:ext uri="{28A0092B-C50C-407E-A947-70E740481C1C}">
                 <a14:useLocalDpi xmlns:a14="http://schemas.microsoft.com/office/drawing/2010/main" val="0"/>
@@ -3753,120 +4872,10 @@
           </a:prstGeom>
         </p:spPr>
       </p:pic>
-      <p:pic>
-        <p:nvPicPr>
-          <p:cNvPr id="6" name="Picture 5"/>
-          <p:cNvPicPr>
-            <a:picLocks noChangeAspect="1"/>
-          </p:cNvPicPr>
-          <p:nvPr/>
-        </p:nvPicPr>
-        <p:blipFill>
-          <a:blip r:embed="rId4">
-            <a:extLst>
-              <a:ext uri="{28A0092B-C50C-407E-A947-70E740481C1C}">
-                <a14:useLocalDpi xmlns:a14="http://schemas.microsoft.com/office/drawing/2010/main" val="0"/>
-              </a:ext>
-            </a:extLst>
-          </a:blip>
-          <a:stretch>
-            <a:fillRect/>
-          </a:stretch>
-        </p:blipFill>
-        <p:spPr>
-          <a:xfrm>
-            <a:off x="6696028" y="250371"/>
-            <a:ext cx="3617054" cy="6346372"/>
-          </a:xfrm>
-          <a:prstGeom prst="rect">
-            <a:avLst/>
-          </a:prstGeom>
-        </p:spPr>
-      </p:pic>
-      <p:sp>
-        <p:nvSpPr>
-          <p:cNvPr id="7" name="Right Arrow 6"/>
-          <p:cNvSpPr/>
-          <p:nvPr/>
-        </p:nvSpPr>
-        <p:spPr>
-          <a:xfrm>
-            <a:off x="4458850" y="3262992"/>
-            <a:ext cx="2155371" cy="321129"/>
-          </a:xfrm>
-          <a:prstGeom prst="rightArrow">
-            <a:avLst/>
-          </a:prstGeom>
-        </p:spPr>
-        <p:style>
-          <a:lnRef idx="2">
-            <a:schemeClr val="accent1">
-              <a:shade val="50000"/>
-            </a:schemeClr>
-          </a:lnRef>
-          <a:fillRef idx="1">
-            <a:schemeClr val="accent1"/>
-          </a:fillRef>
-          <a:effectRef idx="0">
-            <a:schemeClr val="accent1"/>
-          </a:effectRef>
-          <a:fontRef idx="minor">
-            <a:schemeClr val="lt1"/>
-          </a:fontRef>
-        </p:style>
-        <p:txBody>
-          <a:bodyPr rtlCol="0" anchor="ctr"/>
-          <a:lstStyle/>
-          <a:p>
-            <a:pPr algn="ctr"/>
-            <a:endParaRPr lang="en-US"/>
-          </a:p>
-        </p:txBody>
-      </p:sp>
-      <p:sp>
-        <p:nvSpPr>
-          <p:cNvPr id="8" name="Right Arrow 7"/>
-          <p:cNvSpPr/>
-          <p:nvPr/>
-        </p:nvSpPr>
-        <p:spPr>
-          <a:xfrm rot="10800000">
-            <a:off x="4458849" y="4699906"/>
-            <a:ext cx="2155371" cy="321129"/>
-          </a:xfrm>
-          <a:prstGeom prst="rightArrow">
-            <a:avLst/>
-          </a:prstGeom>
-        </p:spPr>
-        <p:style>
-          <a:lnRef idx="2">
-            <a:schemeClr val="accent1">
-              <a:shade val="50000"/>
-            </a:schemeClr>
-          </a:lnRef>
-          <a:fillRef idx="1">
-            <a:schemeClr val="accent1"/>
-          </a:fillRef>
-          <a:effectRef idx="0">
-            <a:schemeClr val="accent1"/>
-          </a:effectRef>
-          <a:fontRef idx="minor">
-            <a:schemeClr val="lt1"/>
-          </a:fontRef>
-        </p:style>
-        <p:txBody>
-          <a:bodyPr rtlCol="0" anchor="ctr"/>
-          <a:lstStyle/>
-          <a:p>
-            <a:pPr algn="ctr"/>
-            <a:endParaRPr lang="en-US"/>
-          </a:p>
-        </p:txBody>
-      </p:sp>
     </p:spTree>
     <p:extLst>
       <p:ext uri="{BB962C8B-B14F-4D97-AF65-F5344CB8AC3E}">
-        <p14:creationId xmlns:p14="http://schemas.microsoft.com/office/powerpoint/2010/main" val="2005016834"/>
+        <p14:creationId xmlns:p14="http://schemas.microsoft.com/office/powerpoint/2010/main" val="1509397266"/>
       </p:ext>
     </p:extLst>
   </p:cSld>
@@ -3909,7 +4918,37 @@
           <p:nvPr/>
         </p:nvPicPr>
         <p:blipFill>
-          <a:blip r:embed="rId2">
+          <a:blip r:embed="rId3">
+            <a:extLst>
+              <a:ext uri="{28A0092B-C50C-407E-A947-70E740481C1C}">
+                <a14:useLocalDpi xmlns:a14="http://schemas.microsoft.com/office/drawing/2010/main" val="0"/>
+              </a:ext>
+            </a:extLst>
+          </a:blip>
+          <a:stretch>
+            <a:fillRect/>
+          </a:stretch>
+        </p:blipFill>
+        <p:spPr>
+          <a:xfrm>
+            <a:off x="675759" y="250371"/>
+            <a:ext cx="3701285" cy="6346372"/>
+          </a:xfrm>
+          <a:prstGeom prst="rect">
+            <a:avLst/>
+          </a:prstGeom>
+        </p:spPr>
+      </p:pic>
+      <p:pic>
+        <p:nvPicPr>
+          <p:cNvPr id="5" name="Picture 4"/>
+          <p:cNvPicPr>
+            <a:picLocks noChangeAspect="1"/>
+          </p:cNvPicPr>
+          <p:nvPr/>
+        </p:nvPicPr>
+        <p:blipFill>
+          <a:blip r:embed="rId4">
             <a:extLst>
               <a:ext uri="{28A0092B-C50C-407E-A947-70E740481C1C}">
                 <a14:useLocalDpi xmlns:a14="http://schemas.microsoft.com/office/drawing/2010/main" val="0"/>
@@ -3932,14 +4971,14 @@
       </p:pic>
       <p:pic>
         <p:nvPicPr>
-          <p:cNvPr id="5" name="Picture 4"/>
+          <p:cNvPr id="6" name="Picture 5"/>
           <p:cNvPicPr>
             <a:picLocks noChangeAspect="1"/>
           </p:cNvPicPr>
           <p:nvPr/>
         </p:nvPicPr>
         <p:blipFill>
-          <a:blip r:embed="rId3">
+          <a:blip r:embed="rId5">
             <a:extLst>
               <a:ext uri="{28A0092B-C50C-407E-A947-70E740481C1C}">
                 <a14:useLocalDpi xmlns:a14="http://schemas.microsoft.com/office/drawing/2010/main" val="0"/>
@@ -3952,8 +4991,8 @@
         </p:blipFill>
         <p:spPr>
           <a:xfrm>
-            <a:off x="1912937" y="596900"/>
-            <a:ext cx="8394700" cy="5664200"/>
+            <a:off x="6696028" y="250371"/>
+            <a:ext cx="3617054" cy="6346372"/>
           </a:xfrm>
           <a:prstGeom prst="rect">
             <a:avLst/>
@@ -3962,23 +5001,18 @@
       </p:pic>
       <p:sp>
         <p:nvSpPr>
-          <p:cNvPr id="6" name="Multiply 5"/>
+          <p:cNvPr id="7" name="Right Arrow 6"/>
           <p:cNvSpPr/>
           <p:nvPr/>
         </p:nvSpPr>
         <p:spPr>
           <a:xfrm>
-            <a:off x="8222861" y="1961697"/>
-            <a:ext cx="2292350" cy="940791"/>
+            <a:off x="4458850" y="3262992"/>
+            <a:ext cx="2155371" cy="321129"/>
           </a:xfrm>
-          <a:prstGeom prst="mathMultiply">
+          <a:prstGeom prst="rightArrow">
             <a:avLst/>
           </a:prstGeom>
-          <a:solidFill>
-            <a:srgbClr val="FF0000">
-              <a:alpha val="33000"/>
-            </a:srgbClr>
-          </a:solidFill>
         </p:spPr>
         <p:style>
           <a:lnRef idx="2">
@@ -4007,23 +5041,18 @@
       </p:sp>
       <p:sp>
         <p:nvSpPr>
-          <p:cNvPr id="8" name="Multiply 7"/>
+          <p:cNvPr id="8" name="Right Arrow 7"/>
           <p:cNvSpPr/>
           <p:nvPr/>
         </p:nvSpPr>
         <p:spPr>
-          <a:xfrm>
-            <a:off x="7532298" y="3429000"/>
-            <a:ext cx="2292350" cy="940791"/>
+          <a:xfrm rot="10800000">
+            <a:off x="4458849" y="4699906"/>
+            <a:ext cx="2155371" cy="321129"/>
           </a:xfrm>
-          <a:prstGeom prst="mathMultiply">
+          <a:prstGeom prst="rightArrow">
             <a:avLst/>
           </a:prstGeom>
-          <a:solidFill>
-            <a:srgbClr val="FF0000">
-              <a:alpha val="33000"/>
-            </a:srgbClr>
-          </a:solidFill>
         </p:spPr>
         <p:style>
           <a:lnRef idx="2">
@@ -4050,100 +5079,10 @@
           </a:p>
         </p:txBody>
       </p:sp>
-      <p:sp>
-        <p:nvSpPr>
-          <p:cNvPr id="9" name="Multiply 8"/>
-          <p:cNvSpPr/>
-          <p:nvPr/>
-        </p:nvSpPr>
-        <p:spPr>
-          <a:xfrm>
-            <a:off x="3046024" y="1020906"/>
-            <a:ext cx="2292350" cy="940791"/>
-          </a:xfrm>
-          <a:prstGeom prst="mathMultiply">
-            <a:avLst/>
-          </a:prstGeom>
-          <a:solidFill>
-            <a:srgbClr val="FF0000">
-              <a:alpha val="33000"/>
-            </a:srgbClr>
-          </a:solidFill>
-        </p:spPr>
-        <p:style>
-          <a:lnRef idx="2">
-            <a:schemeClr val="accent1">
-              <a:shade val="50000"/>
-            </a:schemeClr>
-          </a:lnRef>
-          <a:fillRef idx="1">
-            <a:schemeClr val="accent1"/>
-          </a:fillRef>
-          <a:effectRef idx="0">
-            <a:schemeClr val="accent1"/>
-          </a:effectRef>
-          <a:fontRef idx="minor">
-            <a:schemeClr val="lt1"/>
-          </a:fontRef>
-        </p:style>
-        <p:txBody>
-          <a:bodyPr rtlCol="0" anchor="ctr"/>
-          <a:lstStyle/>
-          <a:p>
-            <a:pPr algn="ctr"/>
-            <a:endParaRPr lang="en-US"/>
-          </a:p>
-        </p:txBody>
-      </p:sp>
-      <p:sp>
-        <p:nvSpPr>
-          <p:cNvPr id="10" name="Multiply 9"/>
-          <p:cNvSpPr/>
-          <p:nvPr/>
-        </p:nvSpPr>
-        <p:spPr>
-          <a:xfrm>
-            <a:off x="2403086" y="1915307"/>
-            <a:ext cx="2292350" cy="940791"/>
-          </a:xfrm>
-          <a:prstGeom prst="mathMultiply">
-            <a:avLst/>
-          </a:prstGeom>
-          <a:solidFill>
-            <a:srgbClr val="FF0000">
-              <a:alpha val="33000"/>
-            </a:srgbClr>
-          </a:solidFill>
-        </p:spPr>
-        <p:style>
-          <a:lnRef idx="2">
-            <a:schemeClr val="accent1">
-              <a:shade val="50000"/>
-            </a:schemeClr>
-          </a:lnRef>
-          <a:fillRef idx="1">
-            <a:schemeClr val="accent1"/>
-          </a:fillRef>
-          <a:effectRef idx="0">
-            <a:schemeClr val="accent1"/>
-          </a:effectRef>
-          <a:fontRef idx="minor">
-            <a:schemeClr val="lt1"/>
-          </a:fontRef>
-        </p:style>
-        <p:txBody>
-          <a:bodyPr rtlCol="0" anchor="ctr"/>
-          <a:lstStyle/>
-          <a:p>
-            <a:pPr algn="ctr"/>
-            <a:endParaRPr lang="en-US"/>
-          </a:p>
-        </p:txBody>
-      </p:sp>
     </p:spTree>
     <p:extLst>
       <p:ext uri="{BB962C8B-B14F-4D97-AF65-F5344CB8AC3E}">
-        <p14:creationId xmlns:p14="http://schemas.microsoft.com/office/powerpoint/2010/main" val="719335139"/>
+        <p14:creationId xmlns:p14="http://schemas.microsoft.com/office/powerpoint/2010/main" val="2005016834"/>
       </p:ext>
     </p:extLst>
   </p:cSld>
@@ -4186,7 +5125,7 @@
           <p:nvPr/>
         </p:nvPicPr>
         <p:blipFill>
-          <a:blip r:embed="rId2">
+          <a:blip r:embed="rId3">
             <a:extLst>
               <a:ext uri="{28A0092B-C50C-407E-A947-70E740481C1C}">
                 <a14:useLocalDpi xmlns:a14="http://schemas.microsoft.com/office/drawing/2010/main" val="0"/>
@@ -4216,7 +5155,284 @@
           <p:nvPr/>
         </p:nvPicPr>
         <p:blipFill>
+          <a:blip r:embed="rId4">
+            <a:extLst>
+              <a:ext uri="{28A0092B-C50C-407E-A947-70E740481C1C}">
+                <a14:useLocalDpi xmlns:a14="http://schemas.microsoft.com/office/drawing/2010/main" val="0"/>
+              </a:ext>
+            </a:extLst>
+          </a:blip>
+          <a:stretch>
+            <a:fillRect/>
+          </a:stretch>
+        </p:blipFill>
+        <p:spPr>
+          <a:xfrm>
+            <a:off x="1912937" y="596900"/>
+            <a:ext cx="8394700" cy="5664200"/>
+          </a:xfrm>
+          <a:prstGeom prst="rect">
+            <a:avLst/>
+          </a:prstGeom>
+        </p:spPr>
+      </p:pic>
+      <p:sp>
+        <p:nvSpPr>
+          <p:cNvPr id="6" name="Multiply 5"/>
+          <p:cNvSpPr/>
+          <p:nvPr/>
+        </p:nvSpPr>
+        <p:spPr>
+          <a:xfrm>
+            <a:off x="8222861" y="1961697"/>
+            <a:ext cx="2292350" cy="940791"/>
+          </a:xfrm>
+          <a:prstGeom prst="mathMultiply">
+            <a:avLst/>
+          </a:prstGeom>
+          <a:solidFill>
+            <a:srgbClr val="FF0000">
+              <a:alpha val="33000"/>
+            </a:srgbClr>
+          </a:solidFill>
+        </p:spPr>
+        <p:style>
+          <a:lnRef idx="2">
+            <a:schemeClr val="accent1">
+              <a:shade val="50000"/>
+            </a:schemeClr>
+          </a:lnRef>
+          <a:fillRef idx="1">
+            <a:schemeClr val="accent1"/>
+          </a:fillRef>
+          <a:effectRef idx="0">
+            <a:schemeClr val="accent1"/>
+          </a:effectRef>
+          <a:fontRef idx="minor">
+            <a:schemeClr val="lt1"/>
+          </a:fontRef>
+        </p:style>
+        <p:txBody>
+          <a:bodyPr rtlCol="0" anchor="ctr"/>
+          <a:lstStyle/>
+          <a:p>
+            <a:pPr algn="ctr"/>
+            <a:endParaRPr lang="en-US"/>
+          </a:p>
+        </p:txBody>
+      </p:sp>
+      <p:sp>
+        <p:nvSpPr>
+          <p:cNvPr id="8" name="Multiply 7"/>
+          <p:cNvSpPr/>
+          <p:nvPr/>
+        </p:nvSpPr>
+        <p:spPr>
+          <a:xfrm>
+            <a:off x="7532298" y="3429000"/>
+            <a:ext cx="2292350" cy="940791"/>
+          </a:xfrm>
+          <a:prstGeom prst="mathMultiply">
+            <a:avLst/>
+          </a:prstGeom>
+          <a:solidFill>
+            <a:srgbClr val="FF0000">
+              <a:alpha val="33000"/>
+            </a:srgbClr>
+          </a:solidFill>
+        </p:spPr>
+        <p:style>
+          <a:lnRef idx="2">
+            <a:schemeClr val="accent1">
+              <a:shade val="50000"/>
+            </a:schemeClr>
+          </a:lnRef>
+          <a:fillRef idx="1">
+            <a:schemeClr val="accent1"/>
+          </a:fillRef>
+          <a:effectRef idx="0">
+            <a:schemeClr val="accent1"/>
+          </a:effectRef>
+          <a:fontRef idx="minor">
+            <a:schemeClr val="lt1"/>
+          </a:fontRef>
+        </p:style>
+        <p:txBody>
+          <a:bodyPr rtlCol="0" anchor="ctr"/>
+          <a:lstStyle/>
+          <a:p>
+            <a:pPr algn="ctr"/>
+            <a:endParaRPr lang="en-US"/>
+          </a:p>
+        </p:txBody>
+      </p:sp>
+      <p:sp>
+        <p:nvSpPr>
+          <p:cNvPr id="9" name="Multiply 8"/>
+          <p:cNvSpPr/>
+          <p:nvPr/>
+        </p:nvSpPr>
+        <p:spPr>
+          <a:xfrm>
+            <a:off x="3046024" y="1020906"/>
+            <a:ext cx="2292350" cy="940791"/>
+          </a:xfrm>
+          <a:prstGeom prst="mathMultiply">
+            <a:avLst/>
+          </a:prstGeom>
+          <a:solidFill>
+            <a:srgbClr val="FF0000">
+              <a:alpha val="33000"/>
+            </a:srgbClr>
+          </a:solidFill>
+        </p:spPr>
+        <p:style>
+          <a:lnRef idx="2">
+            <a:schemeClr val="accent1">
+              <a:shade val="50000"/>
+            </a:schemeClr>
+          </a:lnRef>
+          <a:fillRef idx="1">
+            <a:schemeClr val="accent1"/>
+          </a:fillRef>
+          <a:effectRef idx="0">
+            <a:schemeClr val="accent1"/>
+          </a:effectRef>
+          <a:fontRef idx="minor">
+            <a:schemeClr val="lt1"/>
+          </a:fontRef>
+        </p:style>
+        <p:txBody>
+          <a:bodyPr rtlCol="0" anchor="ctr"/>
+          <a:lstStyle/>
+          <a:p>
+            <a:pPr algn="ctr"/>
+            <a:endParaRPr lang="en-US"/>
+          </a:p>
+        </p:txBody>
+      </p:sp>
+      <p:sp>
+        <p:nvSpPr>
+          <p:cNvPr id="10" name="Multiply 9"/>
+          <p:cNvSpPr/>
+          <p:nvPr/>
+        </p:nvSpPr>
+        <p:spPr>
+          <a:xfrm>
+            <a:off x="2403086" y="1915307"/>
+            <a:ext cx="2292350" cy="940791"/>
+          </a:xfrm>
+          <a:prstGeom prst="mathMultiply">
+            <a:avLst/>
+          </a:prstGeom>
+          <a:solidFill>
+            <a:srgbClr val="FF0000">
+              <a:alpha val="33000"/>
+            </a:srgbClr>
+          </a:solidFill>
+        </p:spPr>
+        <p:style>
+          <a:lnRef idx="2">
+            <a:schemeClr val="accent1">
+              <a:shade val="50000"/>
+            </a:schemeClr>
+          </a:lnRef>
+          <a:fillRef idx="1">
+            <a:schemeClr val="accent1"/>
+          </a:fillRef>
+          <a:effectRef idx="0">
+            <a:schemeClr val="accent1"/>
+          </a:effectRef>
+          <a:fontRef idx="minor">
+            <a:schemeClr val="lt1"/>
+          </a:fontRef>
+        </p:style>
+        <p:txBody>
+          <a:bodyPr rtlCol="0" anchor="ctr"/>
+          <a:lstStyle/>
+          <a:p>
+            <a:pPr algn="ctr"/>
+            <a:endParaRPr lang="en-US"/>
+          </a:p>
+        </p:txBody>
+      </p:sp>
+    </p:spTree>
+    <p:extLst>
+      <p:ext uri="{BB962C8B-B14F-4D97-AF65-F5344CB8AC3E}">
+        <p14:creationId xmlns:p14="http://schemas.microsoft.com/office/powerpoint/2010/main" val="719335139"/>
+      </p:ext>
+    </p:extLst>
+  </p:cSld>
+  <p:clrMapOvr>
+    <a:masterClrMapping/>
+  </p:clrMapOvr>
+  <p:timing>
+    <p:tnLst>
+      <p:par>
+        <p:cTn id="1" dur="indefinite" restart="never" nodeType="tmRoot"/>
+      </p:par>
+    </p:tnLst>
+  </p:timing>
+</p:sld>
+</file>
+
+<file path=ppt/slides/slide6.xml><?xml version="1.0" encoding="utf-8"?>
+<p:sld xmlns:a="http://schemas.openxmlformats.org/drawingml/2006/main" xmlns:r="http://schemas.openxmlformats.org/officeDocument/2006/relationships" xmlns:p="http://schemas.openxmlformats.org/presentationml/2006/main">
+  <p:cSld>
+    <p:spTree>
+      <p:nvGrpSpPr>
+        <p:cNvPr id="1" name=""/>
+        <p:cNvGrpSpPr/>
+        <p:nvPr/>
+      </p:nvGrpSpPr>
+      <p:grpSpPr>
+        <a:xfrm>
+          <a:off x="0" y="0"/>
+          <a:ext cx="0" cy="0"/>
+          <a:chOff x="0" y="0"/>
+          <a:chExt cx="0" cy="0"/>
+        </a:xfrm>
+      </p:grpSpPr>
+      <p:pic>
+        <p:nvPicPr>
+          <p:cNvPr id="4" name="Picture 3"/>
+          <p:cNvPicPr>
+            <a:picLocks noChangeAspect="1"/>
+          </p:cNvPicPr>
+          <p:nvPr/>
+        </p:nvPicPr>
+        <p:blipFill>
           <a:blip r:embed="rId3">
+            <a:extLst>
+              <a:ext uri="{28A0092B-C50C-407E-A947-70E740481C1C}">
+                <a14:useLocalDpi xmlns:a14="http://schemas.microsoft.com/office/drawing/2010/main" val="0"/>
+              </a:ext>
+            </a:extLst>
+          </a:blip>
+          <a:stretch>
+            <a:fillRect/>
+          </a:stretch>
+        </p:blipFill>
+        <p:spPr>
+          <a:xfrm>
+            <a:off x="10737071" y="108857"/>
+            <a:ext cx="1336999" cy="1309914"/>
+          </a:xfrm>
+          <a:prstGeom prst="rect">
+            <a:avLst/>
+          </a:prstGeom>
+        </p:spPr>
+      </p:pic>
+      <p:pic>
+        <p:nvPicPr>
+          <p:cNvPr id="5" name="Picture 4"/>
+          <p:cNvPicPr>
+            <a:picLocks noChangeAspect="1"/>
+          </p:cNvPicPr>
+          <p:nvPr/>
+        </p:nvPicPr>
+        <p:blipFill>
+          <a:blip r:embed="rId4">
             <a:extLst>
               <a:ext uri="{28A0092B-C50C-407E-A947-70E740481C1C}">
                 <a14:useLocalDpi xmlns:a14="http://schemas.microsoft.com/office/drawing/2010/main" val="0"/>
@@ -4257,7 +5473,7 @@
 </p:sld>
 </file>
 
-<file path=ppt/slides/slide6.xml><?xml version="1.0" encoding="utf-8"?>
+<file path=ppt/slides/slide7.xml><?xml version="1.0" encoding="utf-8"?>
 <p:sld xmlns:a="http://schemas.openxmlformats.org/drawingml/2006/main" xmlns:r="http://schemas.openxmlformats.org/officeDocument/2006/relationships" xmlns:p="http://schemas.openxmlformats.org/presentationml/2006/main">
   <p:cSld>
     <p:spTree>
@@ -4283,7 +5499,7 @@
           <p:nvPr/>
         </p:nvPicPr>
         <p:blipFill>
-          <a:blip r:embed="rId2">
+          <a:blip r:embed="rId3">
             <a:extLst>
               <a:ext uri="{28A0092B-C50C-407E-A947-70E740481C1C}">
                 <a14:useLocalDpi xmlns:a14="http://schemas.microsoft.com/office/drawing/2010/main" val="0"/>
@@ -4313,7 +5529,7 @@
           <p:nvPr/>
         </p:nvPicPr>
         <p:blipFill>
-          <a:blip r:embed="rId3">
+          <a:blip r:embed="rId4">
             <a:extLst>
               <a:ext uri="{28A0092B-C50C-407E-A947-70E740481C1C}">
                 <a14:useLocalDpi xmlns:a14="http://schemas.microsoft.com/office/drawing/2010/main" val="0"/>
@@ -4430,119 +5646,6 @@
     <p:extLst>
       <p:ext uri="{BB962C8B-B14F-4D97-AF65-F5344CB8AC3E}">
         <p14:creationId xmlns:p14="http://schemas.microsoft.com/office/powerpoint/2010/main" val="1677335916"/>
-      </p:ext>
-    </p:extLst>
-  </p:cSld>
-  <p:clrMapOvr>
-    <a:masterClrMapping/>
-  </p:clrMapOvr>
-  <p:timing>
-    <p:tnLst>
-      <p:par>
-        <p:cTn id="1" dur="indefinite" restart="never" nodeType="tmRoot"/>
-      </p:par>
-    </p:tnLst>
-  </p:timing>
-</p:sld>
-</file>
-
-<file path=ppt/slides/slide7.xml><?xml version="1.0" encoding="utf-8"?>
-<p:sld xmlns:a="http://schemas.openxmlformats.org/drawingml/2006/main" xmlns:r="http://schemas.openxmlformats.org/officeDocument/2006/relationships" xmlns:p="http://schemas.openxmlformats.org/presentationml/2006/main">
-  <p:cSld>
-    <p:spTree>
-      <p:nvGrpSpPr>
-        <p:cNvPr id="1" name=""/>
-        <p:cNvGrpSpPr/>
-        <p:nvPr/>
-      </p:nvGrpSpPr>
-      <p:grpSpPr>
-        <a:xfrm>
-          <a:off x="0" y="0"/>
-          <a:ext cx="0" cy="0"/>
-          <a:chOff x="0" y="0"/>
-          <a:chExt cx="0" cy="0"/>
-        </a:xfrm>
-      </p:grpSpPr>
-      <p:pic>
-        <p:nvPicPr>
-          <p:cNvPr id="4" name="Picture 3"/>
-          <p:cNvPicPr>
-            <a:picLocks noChangeAspect="1"/>
-          </p:cNvPicPr>
-          <p:nvPr/>
-        </p:nvPicPr>
-        <p:blipFill>
-          <a:blip r:embed="rId2">
-            <a:extLst>
-              <a:ext uri="{28A0092B-C50C-407E-A947-70E740481C1C}">
-                <a14:useLocalDpi xmlns:a14="http://schemas.microsoft.com/office/drawing/2010/main" val="0"/>
-              </a:ext>
-            </a:extLst>
-          </a:blip>
-          <a:stretch>
-            <a:fillRect/>
-          </a:stretch>
-        </p:blipFill>
-        <p:spPr>
-          <a:xfrm>
-            <a:off x="4010875" y="600074"/>
-            <a:ext cx="4170251" cy="4085771"/>
-          </a:xfrm>
-          <a:prstGeom prst="rect">
-            <a:avLst/>
-          </a:prstGeom>
-        </p:spPr>
-      </p:pic>
-      <p:sp>
-        <p:nvSpPr>
-          <p:cNvPr id="6" name="Rectangle 5"/>
-          <p:cNvSpPr/>
-          <p:nvPr/>
-        </p:nvSpPr>
-        <p:spPr>
-          <a:xfrm>
-            <a:off x="4010875" y="5101709"/>
-            <a:ext cx="4117093" cy="1015663"/>
-          </a:xfrm>
-          <a:prstGeom prst="rect">
-            <a:avLst/>
-          </a:prstGeom>
-        </p:spPr>
-        <p:txBody>
-          <a:bodyPr wrap="square">
-            <a:spAutoFit/>
-          </a:bodyPr>
-          <a:lstStyle/>
-          <a:p>
-            <a:pPr algn="ctr"/>
-            <a:r>
-              <a:rPr lang="en-US" sz="6000" b="1" dirty="0" smtClean="0">
-                <a:latin typeface="Arial Rounded MT Bold" charset="0"/>
-                <a:ea typeface="Arial Rounded MT Bold" charset="0"/>
-                <a:cs typeface="Arial Rounded MT Bold" charset="0"/>
-              </a:rPr>
-              <a:t>Demo</a:t>
-            </a:r>
-            <a:r>
-              <a:rPr lang="en-US" sz="6000" b="1" dirty="0" smtClean="0">
-                <a:latin typeface="Arial Rounded MT Bold" charset="0"/>
-                <a:ea typeface="Arial Rounded MT Bold" charset="0"/>
-                <a:cs typeface="Arial Rounded MT Bold" charset="0"/>
-              </a:rPr>
-              <a:t> App</a:t>
-            </a:r>
-            <a:endParaRPr lang="en-US" sz="6000" b="1" dirty="0">
-              <a:latin typeface="Arial Rounded MT Bold" charset="0"/>
-              <a:ea typeface="Arial Rounded MT Bold" charset="0"/>
-              <a:cs typeface="Arial Rounded MT Bold" charset="0"/>
-            </a:endParaRPr>
-          </a:p>
-        </p:txBody>
-      </p:sp>
-    </p:spTree>
-    <p:extLst>
-      <p:ext uri="{BB962C8B-B14F-4D97-AF65-F5344CB8AC3E}">
-        <p14:creationId xmlns:p14="http://schemas.microsoft.com/office/powerpoint/2010/main" val="202216999"/>
       </p:ext>
     </p:extLst>
   </p:cSld>
@@ -4598,326 +5701,64 @@
         </p:blipFill>
         <p:spPr>
           <a:xfrm>
-            <a:off x="147637" y="108857"/>
-            <a:ext cx="5664917" cy="2987260"/>
+            <a:off x="4010875" y="600074"/>
+            <a:ext cx="4170251" cy="4085771"/>
           </a:xfrm>
           <a:prstGeom prst="rect">
             <a:avLst/>
           </a:prstGeom>
         </p:spPr>
       </p:pic>
-      <p:pic>
-        <p:nvPicPr>
-          <p:cNvPr id="5" name="Picture 4"/>
-          <p:cNvPicPr>
-            <a:picLocks noChangeAspect="1"/>
-          </p:cNvPicPr>
+      <p:sp>
+        <p:nvSpPr>
+          <p:cNvPr id="6" name="Rectangle 5"/>
+          <p:cNvSpPr/>
           <p:nvPr/>
-        </p:nvPicPr>
-        <p:blipFill>
-          <a:blip r:embed="rId3">
-            <a:extLst>
-              <a:ext uri="{28A0092B-C50C-407E-A947-70E740481C1C}">
-                <a14:useLocalDpi xmlns:a14="http://schemas.microsoft.com/office/drawing/2010/main" val="0"/>
-              </a:ext>
-            </a:extLst>
-          </a:blip>
-          <a:stretch>
-            <a:fillRect/>
-          </a:stretch>
-        </p:blipFill>
+        </p:nvSpPr>
         <p:spPr>
           <a:xfrm>
-            <a:off x="4371974" y="2426506"/>
-            <a:ext cx="7700964" cy="2216265"/>
+            <a:off x="4010875" y="5101709"/>
+            <a:ext cx="4117093" cy="1015663"/>
           </a:xfrm>
           <a:prstGeom prst="rect">
             <a:avLst/>
           </a:prstGeom>
         </p:spPr>
-      </p:pic>
-      <p:pic>
-        <p:nvPicPr>
-          <p:cNvPr id="6" name="Picture 5"/>
-          <p:cNvPicPr>
-            <a:picLocks noChangeAspect="1"/>
-          </p:cNvPicPr>
-          <p:nvPr/>
-        </p:nvPicPr>
-        <p:blipFill>
-          <a:blip r:embed="rId4">
-            <a:extLst>
-              <a:ext uri="{28A0092B-C50C-407E-A947-70E740481C1C}">
-                <a14:useLocalDpi xmlns:a14="http://schemas.microsoft.com/office/drawing/2010/main" val="0"/>
-              </a:ext>
-            </a:extLst>
-          </a:blip>
-          <a:stretch>
-            <a:fillRect/>
-          </a:stretch>
-        </p:blipFill>
-        <p:spPr>
-          <a:xfrm>
-            <a:off x="4552952" y="4727765"/>
-            <a:ext cx="7519986" cy="2130235"/>
-          </a:xfrm>
-          <a:prstGeom prst="rect">
-            <a:avLst/>
-          </a:prstGeom>
-        </p:spPr>
-      </p:pic>
-      <p:pic>
-        <p:nvPicPr>
-          <p:cNvPr id="7" name="Picture 6"/>
-          <p:cNvPicPr>
-            <a:picLocks noChangeAspect="1"/>
-          </p:cNvPicPr>
-          <p:nvPr/>
-        </p:nvPicPr>
-        <p:blipFill>
-          <a:blip r:embed="rId5">
-            <a:extLst>
-              <a:ext uri="{28A0092B-C50C-407E-A947-70E740481C1C}">
-                <a14:useLocalDpi xmlns:a14="http://schemas.microsoft.com/office/drawing/2010/main" val="0"/>
-              </a:ext>
-            </a:extLst>
-          </a:blip>
-          <a:stretch>
-            <a:fillRect/>
-          </a:stretch>
-        </p:blipFill>
-        <p:spPr>
-          <a:xfrm>
-            <a:off x="10737071" y="108857"/>
-            <a:ext cx="1336999" cy="1309914"/>
-          </a:xfrm>
-          <a:prstGeom prst="rect">
-            <a:avLst/>
-          </a:prstGeom>
-        </p:spPr>
-      </p:pic>
-      <p:sp>
-        <p:nvSpPr>
-          <p:cNvPr id="8" name="TextBox 7"/>
-          <p:cNvSpPr txBox="1"/>
-          <p:nvPr/>
-        </p:nvSpPr>
-        <p:spPr>
-          <a:xfrm>
-            <a:off x="6029325" y="108857"/>
-            <a:ext cx="4707746" cy="2000548"/>
-          </a:xfrm>
-          <a:prstGeom prst="rect">
-            <a:avLst/>
-          </a:prstGeom>
-          <a:noFill/>
-        </p:spPr>
-        <p:txBody>
-          <a:bodyPr wrap="square" rtlCol="0">
+        <p:txBody>
+          <a:bodyPr wrap="square">
             <a:spAutoFit/>
           </a:bodyPr>
           <a:lstStyle/>
           <a:p>
-            <a:r>
-              <a:rPr lang="en-US" sz="3200" dirty="0" smtClean="0">
+            <a:pPr algn="ctr"/>
+            <a:r>
+              <a:rPr lang="en-US" sz="6000" b="1" dirty="0" smtClean="0">
                 <a:latin typeface="Arial Rounded MT Bold" charset="0"/>
                 <a:ea typeface="Arial Rounded MT Bold" charset="0"/>
                 <a:cs typeface="Arial Rounded MT Bold" charset="0"/>
               </a:rPr>
-              <a:t>Favorite Code</a:t>
-            </a:r>
-          </a:p>
-          <a:p>
-            <a:endParaRPr lang="en-US" sz="3200" dirty="0" smtClean="0">
+              <a:t>Demo</a:t>
+            </a:r>
+            <a:r>
+              <a:rPr lang="en-US" sz="6000" b="1" dirty="0" smtClean="0">
+                <a:latin typeface="Arial Rounded MT Bold" charset="0"/>
+                <a:ea typeface="Arial Rounded MT Bold" charset="0"/>
+                <a:cs typeface="Arial Rounded MT Bold" charset="0"/>
+              </a:rPr>
+              <a:t> App</a:t>
+            </a:r>
+            <a:endParaRPr lang="en-US" sz="6000" b="1" dirty="0">
               <a:latin typeface="Arial Rounded MT Bold" charset="0"/>
               <a:ea typeface="Arial Rounded MT Bold" charset="0"/>
               <a:cs typeface="Arial Rounded MT Bold" charset="0"/>
             </a:endParaRPr>
           </a:p>
-          <a:p>
-            <a:r>
-              <a:rPr lang="en-US" sz="2000" dirty="0" smtClean="0">
-                <a:latin typeface="Arial Rounded MT Bold" charset="0"/>
-                <a:ea typeface="Arial Rounded MT Bold" charset="0"/>
-                <a:cs typeface="Arial Rounded MT Bold" charset="0"/>
-              </a:rPr>
-              <a:t>Code checks if player has </a:t>
-            </a:r>
-            <a:r>
-              <a:rPr lang="en-US" sz="2000" dirty="0" err="1" smtClean="0">
-                <a:latin typeface="Arial Rounded MT Bold" charset="0"/>
-                <a:ea typeface="Arial Rounded MT Bold" charset="0"/>
-                <a:cs typeface="Arial Rounded MT Bold" charset="0"/>
-              </a:rPr>
-              <a:t>BlackJack</a:t>
-            </a:r>
-            <a:r>
-              <a:rPr lang="en-US" sz="2000" dirty="0" smtClean="0">
-                <a:latin typeface="Arial Rounded MT Bold" charset="0"/>
-                <a:ea typeface="Arial Rounded MT Bold" charset="0"/>
-                <a:cs typeface="Arial Rounded MT Bold" charset="0"/>
-              </a:rPr>
-              <a:t> by checking for and ACE and a card value greater than 9</a:t>
-            </a:r>
-            <a:endParaRPr lang="en-US" sz="2000" dirty="0">
-              <a:latin typeface="Arial Rounded MT Bold" charset="0"/>
-              <a:ea typeface="Arial Rounded MT Bold" charset="0"/>
-              <a:cs typeface="Arial Rounded MT Bold" charset="0"/>
-            </a:endParaRPr>
-          </a:p>
-        </p:txBody>
-      </p:sp>
-      <p:sp>
-        <p:nvSpPr>
-          <p:cNvPr id="9" name="TextBox 8"/>
-          <p:cNvSpPr txBox="1"/>
-          <p:nvPr/>
-        </p:nvSpPr>
-        <p:spPr>
-          <a:xfrm>
-            <a:off x="147637" y="3207559"/>
-            <a:ext cx="4024313" cy="3139321"/>
-          </a:xfrm>
-          <a:prstGeom prst="rect">
-            <a:avLst/>
-          </a:prstGeom>
-          <a:noFill/>
-        </p:spPr>
-        <p:txBody>
-          <a:bodyPr wrap="square" rtlCol="0">
-            <a:spAutoFit/>
-          </a:bodyPr>
-          <a:lstStyle/>
-          <a:p>
-            <a:r>
-              <a:rPr lang="en-US" dirty="0" smtClean="0">
-                <a:latin typeface="Arial Rounded MT Bold" charset="0"/>
-                <a:ea typeface="Arial Rounded MT Bold" charset="0"/>
-                <a:cs typeface="Arial Rounded MT Bold" charset="0"/>
-              </a:rPr>
-              <a:t>This is called twice </a:t>
-            </a:r>
-            <a:r>
-              <a:rPr lang="mr-IN" dirty="0" smtClean="0">
-                <a:latin typeface="Arial Rounded MT Bold" charset="0"/>
-                <a:ea typeface="Arial Rounded MT Bold" charset="0"/>
-                <a:cs typeface="Arial Rounded MT Bold" charset="0"/>
-              </a:rPr>
-              <a:t>–</a:t>
-            </a:r>
-            <a:endParaRPr lang="en-US" dirty="0" smtClean="0">
-              <a:latin typeface="Arial Rounded MT Bold" charset="0"/>
-              <a:ea typeface="Arial Rounded MT Bold" charset="0"/>
-              <a:cs typeface="Arial Rounded MT Bold" charset="0"/>
-            </a:endParaRPr>
-          </a:p>
-          <a:p>
-            <a:endParaRPr lang="en-US" dirty="0">
-              <a:latin typeface="Arial Rounded MT Bold" charset="0"/>
-              <a:ea typeface="Arial Rounded MT Bold" charset="0"/>
-              <a:cs typeface="Arial Rounded MT Bold" charset="0"/>
-            </a:endParaRPr>
-          </a:p>
-          <a:p>
-            <a:r>
-              <a:rPr lang="en-US" dirty="0" smtClean="0">
-                <a:latin typeface="Arial Rounded MT Bold" charset="0"/>
-                <a:ea typeface="Arial Rounded MT Bold" charset="0"/>
-                <a:cs typeface="Arial Rounded MT Bold" charset="0"/>
-              </a:rPr>
-              <a:t>Once when the activity is created to see if Player 1 has </a:t>
-            </a:r>
-            <a:r>
-              <a:rPr lang="en-US" dirty="0" err="1" smtClean="0">
-                <a:latin typeface="Arial Rounded MT Bold" charset="0"/>
-                <a:ea typeface="Arial Rounded MT Bold" charset="0"/>
-                <a:cs typeface="Arial Rounded MT Bold" charset="0"/>
-              </a:rPr>
-              <a:t>BlackJack</a:t>
-            </a:r>
-            <a:r>
-              <a:rPr lang="en-US" dirty="0" smtClean="0">
-                <a:latin typeface="Arial Rounded MT Bold" charset="0"/>
-                <a:ea typeface="Arial Rounded MT Bold" charset="0"/>
-                <a:cs typeface="Arial Rounded MT Bold" charset="0"/>
-              </a:rPr>
-              <a:t> (and if true, if Dealer has </a:t>
-            </a:r>
-            <a:r>
-              <a:rPr lang="en-US" dirty="0" err="1" smtClean="0">
-                <a:latin typeface="Arial Rounded MT Bold" charset="0"/>
-                <a:ea typeface="Arial Rounded MT Bold" charset="0"/>
-                <a:cs typeface="Arial Rounded MT Bold" charset="0"/>
-              </a:rPr>
-              <a:t>BlackJack</a:t>
-            </a:r>
-            <a:r>
-              <a:rPr lang="en-US" dirty="0" smtClean="0">
-                <a:latin typeface="Arial Rounded MT Bold" charset="0"/>
-                <a:ea typeface="Arial Rounded MT Bold" charset="0"/>
-                <a:cs typeface="Arial Rounded MT Bold" charset="0"/>
-              </a:rPr>
-              <a:t>)</a:t>
-            </a:r>
-          </a:p>
-          <a:p>
-            <a:endParaRPr lang="en-US" dirty="0">
-              <a:latin typeface="Arial Rounded MT Bold" charset="0"/>
-              <a:ea typeface="Arial Rounded MT Bold" charset="0"/>
-              <a:cs typeface="Arial Rounded MT Bold" charset="0"/>
-            </a:endParaRPr>
-          </a:p>
-          <a:p>
-            <a:endParaRPr lang="en-US" dirty="0" smtClean="0">
-              <a:latin typeface="Arial Rounded MT Bold" charset="0"/>
-              <a:ea typeface="Arial Rounded MT Bold" charset="0"/>
-              <a:cs typeface="Arial Rounded MT Bold" charset="0"/>
-            </a:endParaRPr>
-          </a:p>
-          <a:p>
-            <a:endParaRPr lang="en-US" dirty="0">
-              <a:latin typeface="Arial Rounded MT Bold" charset="0"/>
-              <a:ea typeface="Arial Rounded MT Bold" charset="0"/>
-              <a:cs typeface="Arial Rounded MT Bold" charset="0"/>
-            </a:endParaRPr>
-          </a:p>
-          <a:p>
-            <a:r>
-              <a:rPr lang="en-US" dirty="0" smtClean="0">
-                <a:latin typeface="Arial Rounded MT Bold" charset="0"/>
-                <a:ea typeface="Arial Rounded MT Bold" charset="0"/>
-                <a:cs typeface="Arial Rounded MT Bold" charset="0"/>
-              </a:rPr>
-              <a:t>And again, on dealers turn, to determine if </a:t>
-            </a:r>
-            <a:r>
-              <a:rPr lang="en-US" dirty="0" err="1" smtClean="0">
-                <a:latin typeface="Arial Rounded MT Bold" charset="0"/>
-                <a:ea typeface="Arial Rounded MT Bold" charset="0"/>
-                <a:cs typeface="Arial Rounded MT Bold" charset="0"/>
-              </a:rPr>
-              <a:t>BlackJack</a:t>
-            </a:r>
-            <a:r>
-              <a:rPr lang="en-US" dirty="0" smtClean="0">
-                <a:latin typeface="Arial Rounded MT Bold" charset="0"/>
-                <a:ea typeface="Arial Rounded MT Bold" charset="0"/>
-                <a:cs typeface="Arial Rounded MT Bold" charset="0"/>
-              </a:rPr>
-              <a:t> is present</a:t>
-            </a:r>
-            <a:endParaRPr lang="en-US" dirty="0">
-              <a:latin typeface="Arial Rounded MT Bold" charset="0"/>
-              <a:ea typeface="Arial Rounded MT Bold" charset="0"/>
-              <a:cs typeface="Arial Rounded MT Bold" charset="0"/>
-            </a:endParaRPr>
-          </a:p>
         </p:txBody>
       </p:sp>
     </p:spTree>
     <p:extLst>
       <p:ext uri="{BB962C8B-B14F-4D97-AF65-F5344CB8AC3E}">
-        <p14:creationId xmlns:p14="http://schemas.microsoft.com/office/powerpoint/2010/main" val="1210834762"/>
+        <p14:creationId xmlns:p14="http://schemas.microsoft.com/office/powerpoint/2010/main" val="202216999"/>
       </p:ext>
     </p:extLst>
   </p:cSld>
@@ -4951,192 +5792,36 @@
           <a:chExt cx="0" cy="0"/>
         </a:xfrm>
       </p:grpSpPr>
-      <p:sp>
-        <p:nvSpPr>
-          <p:cNvPr id="4" name="TextBox 3"/>
-          <p:cNvSpPr txBox="1"/>
+      <p:pic>
+        <p:nvPicPr>
+          <p:cNvPr id="4" name="Picture 3"/>
+          <p:cNvPicPr>
+            <a:picLocks noChangeAspect="1"/>
+          </p:cNvPicPr>
           <p:nvPr/>
-        </p:nvSpPr>
+        </p:nvPicPr>
+        <p:blipFill>
+          <a:blip r:embed="rId3">
+            <a:extLst>
+              <a:ext uri="{28A0092B-C50C-407E-A947-70E740481C1C}">
+                <a14:useLocalDpi xmlns:a14="http://schemas.microsoft.com/office/drawing/2010/main" val="0"/>
+              </a:ext>
+            </a:extLst>
+          </a:blip>
+          <a:stretch>
+            <a:fillRect/>
+          </a:stretch>
+        </p:blipFill>
         <p:spPr>
           <a:xfrm>
-            <a:off x="600075" y="314325"/>
-            <a:ext cx="9915525" cy="4893647"/>
+            <a:off x="147637" y="108857"/>
+            <a:ext cx="5664917" cy="2987260"/>
           </a:xfrm>
           <a:prstGeom prst="rect">
             <a:avLst/>
           </a:prstGeom>
-          <a:noFill/>
         </p:spPr>
-        <p:txBody>
-          <a:bodyPr wrap="square" rtlCol="0">
-            <a:spAutoFit/>
-          </a:bodyPr>
-          <a:lstStyle/>
-          <a:p>
-            <a:r>
-              <a:rPr lang="en-US" sz="6000" dirty="0" smtClean="0">
-                <a:latin typeface="Arial Rounded MT Bold" charset="0"/>
-                <a:ea typeface="Arial Rounded MT Bold" charset="0"/>
-                <a:cs typeface="Arial Rounded MT Bold" charset="0"/>
-              </a:rPr>
-              <a:t>My learning Points</a:t>
-            </a:r>
-            <a:r>
-              <a:rPr lang="mr-IN" sz="6000" dirty="0" smtClean="0">
-                <a:latin typeface="Arial Rounded MT Bold" charset="0"/>
-                <a:ea typeface="Arial Rounded MT Bold" charset="0"/>
-                <a:cs typeface="Arial Rounded MT Bold" charset="0"/>
-              </a:rPr>
-              <a:t>…</a:t>
-            </a:r>
-            <a:endParaRPr lang="en-GB" sz="6000" dirty="0" smtClean="0">
-              <a:latin typeface="Arial Rounded MT Bold" charset="0"/>
-              <a:ea typeface="Arial Rounded MT Bold" charset="0"/>
-              <a:cs typeface="Arial Rounded MT Bold" charset="0"/>
-            </a:endParaRPr>
-          </a:p>
-          <a:p>
-            <a:endParaRPr lang="en-GB" sz="6000" dirty="0">
-              <a:latin typeface="Arial Rounded MT Bold" charset="0"/>
-              <a:ea typeface="Arial Rounded MT Bold" charset="0"/>
-              <a:cs typeface="Arial Rounded MT Bold" charset="0"/>
-            </a:endParaRPr>
-          </a:p>
-          <a:p>
-            <a:pPr marL="342900" indent="-342900">
-              <a:buFont typeface="Wingdings" charset="2"/>
-              <a:buChar char="ü"/>
-            </a:pPr>
-            <a:r>
-              <a:rPr lang="en-GB" sz="2400" dirty="0" smtClean="0">
-                <a:latin typeface="Arial Rounded MT Bold" charset="0"/>
-                <a:ea typeface="Arial Rounded MT Bold" charset="0"/>
-                <a:cs typeface="Arial Rounded MT Bold" charset="0"/>
-              </a:rPr>
-              <a:t>I need to make better use of planning aides(</a:t>
-            </a:r>
-            <a:r>
-              <a:rPr lang="en-GB" sz="2400" dirty="0" err="1" smtClean="0">
-                <a:latin typeface="Arial Rounded MT Bold" charset="0"/>
-                <a:ea typeface="Arial Rounded MT Bold" charset="0"/>
-                <a:cs typeface="Arial Rounded MT Bold" charset="0"/>
-              </a:rPr>
-              <a:t>eg</a:t>
-            </a:r>
-            <a:r>
-              <a:rPr lang="en-GB" sz="2400" dirty="0" smtClean="0">
-                <a:latin typeface="Arial Rounded MT Bold" charset="0"/>
-                <a:ea typeface="Arial Rounded MT Bold" charset="0"/>
-                <a:cs typeface="Arial Rounded MT Bold" charset="0"/>
-              </a:rPr>
-              <a:t> Trello)</a:t>
-            </a:r>
-            <a:endParaRPr lang="en-GB" sz="2400" dirty="0" smtClean="0">
-              <a:latin typeface="Arial Rounded MT Bold" charset="0"/>
-              <a:ea typeface="Arial Rounded MT Bold" charset="0"/>
-              <a:cs typeface="Arial Rounded MT Bold" charset="0"/>
-            </a:endParaRPr>
-          </a:p>
-          <a:p>
-            <a:pPr marL="342900" indent="-342900">
-              <a:buFont typeface="Wingdings" charset="2"/>
-              <a:buChar char="ü"/>
-            </a:pPr>
-            <a:endParaRPr lang="en-GB" sz="2400" dirty="0">
-              <a:latin typeface="Arial Rounded MT Bold" charset="0"/>
-              <a:ea typeface="Arial Rounded MT Bold" charset="0"/>
-              <a:cs typeface="Arial Rounded MT Bold" charset="0"/>
-            </a:endParaRPr>
-          </a:p>
-          <a:p>
-            <a:pPr marL="342900" indent="-342900">
-              <a:buFont typeface="Wingdings" charset="2"/>
-              <a:buChar char="ü"/>
-            </a:pPr>
-            <a:r>
-              <a:rPr lang="en-GB" sz="2400" dirty="0" smtClean="0">
-                <a:latin typeface="Arial Rounded MT Bold" charset="0"/>
-                <a:ea typeface="Arial Rounded MT Bold" charset="0"/>
-                <a:cs typeface="Arial Rounded MT Bold" charset="0"/>
-              </a:rPr>
-              <a:t>I have written so many loops I think I now know what loops do!</a:t>
-            </a:r>
-          </a:p>
-          <a:p>
-            <a:pPr marL="342900" indent="-342900">
-              <a:buFont typeface="Wingdings" charset="2"/>
-              <a:buChar char="ü"/>
-            </a:pPr>
-            <a:endParaRPr lang="en-GB" sz="2400" dirty="0">
-              <a:latin typeface="Arial Rounded MT Bold" charset="0"/>
-              <a:ea typeface="Arial Rounded MT Bold" charset="0"/>
-              <a:cs typeface="Arial Rounded MT Bold" charset="0"/>
-            </a:endParaRPr>
-          </a:p>
-          <a:p>
-            <a:pPr marL="342900" indent="-342900">
-              <a:buFont typeface="Wingdings" charset="2"/>
-              <a:buChar char="ü"/>
-            </a:pPr>
-            <a:r>
-              <a:rPr lang="en-GB" sz="2400" dirty="0" smtClean="0">
-                <a:latin typeface="Arial Rounded MT Bold" charset="0"/>
-                <a:ea typeface="Arial Rounded MT Bold" charset="0"/>
-                <a:cs typeface="Arial Rounded MT Bold" charset="0"/>
-              </a:rPr>
-              <a:t>I feel I now have a better understanding of SOLID principles</a:t>
-            </a:r>
-          </a:p>
-          <a:p>
-            <a:pPr marL="342900" indent="-342900">
-              <a:buFont typeface="Wingdings" charset="2"/>
-              <a:buChar char="ü"/>
-            </a:pPr>
-            <a:endParaRPr lang="en-GB" sz="2400" dirty="0">
-              <a:latin typeface="Arial Rounded MT Bold" charset="0"/>
-              <a:ea typeface="Arial Rounded MT Bold" charset="0"/>
-              <a:cs typeface="Arial Rounded MT Bold" charset="0"/>
-            </a:endParaRPr>
-          </a:p>
-          <a:p>
-            <a:pPr marL="342900" indent="-342900">
-              <a:buFont typeface="Wingdings" charset="2"/>
-              <a:buChar char="ü"/>
-            </a:pPr>
-            <a:r>
-              <a:rPr lang="en-GB" sz="2400" dirty="0" smtClean="0">
-                <a:latin typeface="Arial Rounded MT Bold" charset="0"/>
-                <a:ea typeface="Arial Rounded MT Bold" charset="0"/>
-                <a:cs typeface="Arial Rounded MT Bold" charset="0"/>
-              </a:rPr>
-              <a:t>Refactoring is hard </a:t>
-            </a:r>
-            <a:r>
-              <a:rPr lang="mr-IN" sz="2400" dirty="0" smtClean="0">
-                <a:latin typeface="Arial Rounded MT Bold" charset="0"/>
-                <a:ea typeface="Arial Rounded MT Bold" charset="0"/>
-                <a:cs typeface="Arial Rounded MT Bold" charset="0"/>
-              </a:rPr>
-              <a:t>–</a:t>
-            </a:r>
-            <a:r>
-              <a:rPr lang="en-GB" sz="2400" dirty="0" smtClean="0">
-                <a:latin typeface="Arial Rounded MT Bold" charset="0"/>
-                <a:ea typeface="Arial Rounded MT Bold" charset="0"/>
-                <a:cs typeface="Arial Rounded MT Bold" charset="0"/>
-              </a:rPr>
-              <a:t> try to get things in the right place first time</a:t>
-            </a:r>
-          </a:p>
-          <a:p>
-            <a:endParaRPr lang="en-GB" sz="2400" dirty="0">
-              <a:latin typeface="Arial Rounded MT Bold" charset="0"/>
-              <a:ea typeface="Arial Rounded MT Bold" charset="0"/>
-              <a:cs typeface="Arial Rounded MT Bold" charset="0"/>
-            </a:endParaRPr>
-          </a:p>
-        </p:txBody>
-      </p:sp>
+      </p:pic>
       <p:pic>
         <p:nvPicPr>
           <p:cNvPr id="5" name="Picture 4"/>
@@ -5146,7 +5831,67 @@
           <p:nvPr/>
         </p:nvPicPr>
         <p:blipFill>
-          <a:blip r:embed="rId2">
+          <a:blip r:embed="rId4">
+            <a:extLst>
+              <a:ext uri="{28A0092B-C50C-407E-A947-70E740481C1C}">
+                <a14:useLocalDpi xmlns:a14="http://schemas.microsoft.com/office/drawing/2010/main" val="0"/>
+              </a:ext>
+            </a:extLst>
+          </a:blip>
+          <a:stretch>
+            <a:fillRect/>
+          </a:stretch>
+        </p:blipFill>
+        <p:spPr>
+          <a:xfrm>
+            <a:off x="4371974" y="2426506"/>
+            <a:ext cx="7700964" cy="2216265"/>
+          </a:xfrm>
+          <a:prstGeom prst="rect">
+            <a:avLst/>
+          </a:prstGeom>
+        </p:spPr>
+      </p:pic>
+      <p:pic>
+        <p:nvPicPr>
+          <p:cNvPr id="6" name="Picture 5"/>
+          <p:cNvPicPr>
+            <a:picLocks noChangeAspect="1"/>
+          </p:cNvPicPr>
+          <p:nvPr/>
+        </p:nvPicPr>
+        <p:blipFill>
+          <a:blip r:embed="rId5">
+            <a:extLst>
+              <a:ext uri="{28A0092B-C50C-407E-A947-70E740481C1C}">
+                <a14:useLocalDpi xmlns:a14="http://schemas.microsoft.com/office/drawing/2010/main" val="0"/>
+              </a:ext>
+            </a:extLst>
+          </a:blip>
+          <a:stretch>
+            <a:fillRect/>
+          </a:stretch>
+        </p:blipFill>
+        <p:spPr>
+          <a:xfrm>
+            <a:off x="4552952" y="4727765"/>
+            <a:ext cx="7519986" cy="2130235"/>
+          </a:xfrm>
+          <a:prstGeom prst="rect">
+            <a:avLst/>
+          </a:prstGeom>
+        </p:spPr>
+      </p:pic>
+      <p:pic>
+        <p:nvPicPr>
+          <p:cNvPr id="7" name="Picture 6"/>
+          <p:cNvPicPr>
+            <a:picLocks noChangeAspect="1"/>
+          </p:cNvPicPr>
+          <p:nvPr/>
+        </p:nvPicPr>
+        <p:blipFill>
+          <a:blip r:embed="rId6">
             <a:extLst>
               <a:ext uri="{28A0092B-C50C-407E-A947-70E740481C1C}">
                 <a14:useLocalDpi xmlns:a14="http://schemas.microsoft.com/office/drawing/2010/main" val="0"/>
@@ -5167,10 +5912,228 @@
           </a:prstGeom>
         </p:spPr>
       </p:pic>
+      <p:sp>
+        <p:nvSpPr>
+          <p:cNvPr id="8" name="TextBox 7"/>
+          <p:cNvSpPr txBox="1"/>
+          <p:nvPr/>
+        </p:nvSpPr>
+        <p:spPr>
+          <a:xfrm>
+            <a:off x="6029325" y="108857"/>
+            <a:ext cx="4707746" cy="2000548"/>
+          </a:xfrm>
+          <a:prstGeom prst="rect">
+            <a:avLst/>
+          </a:prstGeom>
+          <a:noFill/>
+        </p:spPr>
+        <p:txBody>
+          <a:bodyPr wrap="square" rtlCol="0">
+            <a:spAutoFit/>
+          </a:bodyPr>
+          <a:lstStyle/>
+          <a:p>
+            <a:r>
+              <a:rPr lang="en-US" sz="3200" dirty="0" smtClean="0">
+                <a:latin typeface="Arial Rounded MT Bold" charset="0"/>
+                <a:ea typeface="Arial Rounded MT Bold" charset="0"/>
+                <a:cs typeface="Arial Rounded MT Bold" charset="0"/>
+              </a:rPr>
+              <a:t>Favorite Code</a:t>
+            </a:r>
+          </a:p>
+          <a:p>
+            <a:endParaRPr lang="en-US" sz="3200" dirty="0" smtClean="0">
+              <a:latin typeface="Arial Rounded MT Bold" charset="0"/>
+              <a:ea typeface="Arial Rounded MT Bold" charset="0"/>
+              <a:cs typeface="Arial Rounded MT Bold" charset="0"/>
+            </a:endParaRPr>
+          </a:p>
+          <a:p>
+            <a:r>
+              <a:rPr lang="en-US" sz="2000" dirty="0" smtClean="0">
+                <a:latin typeface="Arial Rounded MT Bold" charset="0"/>
+                <a:ea typeface="Arial Rounded MT Bold" charset="0"/>
+                <a:cs typeface="Arial Rounded MT Bold" charset="0"/>
+              </a:rPr>
+              <a:t>Code checks if player has </a:t>
+            </a:r>
+            <a:r>
+              <a:rPr lang="en-US" sz="2000" dirty="0" err="1" smtClean="0">
+                <a:latin typeface="Arial Rounded MT Bold" charset="0"/>
+                <a:ea typeface="Arial Rounded MT Bold" charset="0"/>
+                <a:cs typeface="Arial Rounded MT Bold" charset="0"/>
+              </a:rPr>
+              <a:t>BlackJack</a:t>
+            </a:r>
+            <a:r>
+              <a:rPr lang="en-US" sz="2000" dirty="0" smtClean="0">
+                <a:latin typeface="Arial Rounded MT Bold" charset="0"/>
+                <a:ea typeface="Arial Rounded MT Bold" charset="0"/>
+                <a:cs typeface="Arial Rounded MT Bold" charset="0"/>
+              </a:rPr>
+              <a:t> by checking for and ACE and a card value greater than 9</a:t>
+            </a:r>
+            <a:endParaRPr lang="en-US" sz="2000" dirty="0">
+              <a:latin typeface="Arial Rounded MT Bold" charset="0"/>
+              <a:ea typeface="Arial Rounded MT Bold" charset="0"/>
+              <a:cs typeface="Arial Rounded MT Bold" charset="0"/>
+            </a:endParaRPr>
+          </a:p>
+        </p:txBody>
+      </p:sp>
+      <p:sp>
+        <p:nvSpPr>
+          <p:cNvPr id="9" name="TextBox 8"/>
+          <p:cNvSpPr txBox="1"/>
+          <p:nvPr/>
+        </p:nvSpPr>
+        <p:spPr>
+          <a:xfrm>
+            <a:off x="147637" y="3207559"/>
+            <a:ext cx="4024313" cy="3139321"/>
+          </a:xfrm>
+          <a:prstGeom prst="rect">
+            <a:avLst/>
+          </a:prstGeom>
+          <a:noFill/>
+        </p:spPr>
+        <p:txBody>
+          <a:bodyPr wrap="square" rtlCol="0">
+            <a:spAutoFit/>
+          </a:bodyPr>
+          <a:lstStyle/>
+          <a:p>
+            <a:r>
+              <a:rPr lang="en-US" dirty="0" smtClean="0">
+                <a:latin typeface="Arial Rounded MT Bold" charset="0"/>
+                <a:ea typeface="Arial Rounded MT Bold" charset="0"/>
+                <a:cs typeface="Arial Rounded MT Bold" charset="0"/>
+              </a:rPr>
+              <a:t>This is called twice </a:t>
+            </a:r>
+            <a:r>
+              <a:rPr lang="mr-IN" dirty="0" smtClean="0">
+                <a:latin typeface="Arial Rounded MT Bold" charset="0"/>
+                <a:ea typeface="Arial Rounded MT Bold" charset="0"/>
+                <a:cs typeface="Arial Rounded MT Bold" charset="0"/>
+              </a:rPr>
+              <a:t>–</a:t>
+            </a:r>
+            <a:endParaRPr lang="en-US" dirty="0" smtClean="0">
+              <a:latin typeface="Arial Rounded MT Bold" charset="0"/>
+              <a:ea typeface="Arial Rounded MT Bold" charset="0"/>
+              <a:cs typeface="Arial Rounded MT Bold" charset="0"/>
+            </a:endParaRPr>
+          </a:p>
+          <a:p>
+            <a:endParaRPr lang="en-US" dirty="0">
+              <a:latin typeface="Arial Rounded MT Bold" charset="0"/>
+              <a:ea typeface="Arial Rounded MT Bold" charset="0"/>
+              <a:cs typeface="Arial Rounded MT Bold" charset="0"/>
+            </a:endParaRPr>
+          </a:p>
+          <a:p>
+            <a:r>
+              <a:rPr lang="en-US" dirty="0" smtClean="0">
+                <a:latin typeface="Arial Rounded MT Bold" charset="0"/>
+                <a:ea typeface="Arial Rounded MT Bold" charset="0"/>
+                <a:cs typeface="Arial Rounded MT Bold" charset="0"/>
+              </a:rPr>
+              <a:t>Once when the activity is created to see if Player 1 has </a:t>
+            </a:r>
+            <a:r>
+              <a:rPr lang="en-US" dirty="0" err="1" smtClean="0">
+                <a:latin typeface="Arial Rounded MT Bold" charset="0"/>
+                <a:ea typeface="Arial Rounded MT Bold" charset="0"/>
+                <a:cs typeface="Arial Rounded MT Bold" charset="0"/>
+              </a:rPr>
+              <a:t>BlackJack</a:t>
+            </a:r>
+            <a:r>
+              <a:rPr lang="en-US" dirty="0" smtClean="0">
+                <a:latin typeface="Arial Rounded MT Bold" charset="0"/>
+                <a:ea typeface="Arial Rounded MT Bold" charset="0"/>
+                <a:cs typeface="Arial Rounded MT Bold" charset="0"/>
+              </a:rPr>
+              <a:t> (and if true, if Dealer has </a:t>
+            </a:r>
+            <a:r>
+              <a:rPr lang="en-US" dirty="0" err="1" smtClean="0">
+                <a:latin typeface="Arial Rounded MT Bold" charset="0"/>
+                <a:ea typeface="Arial Rounded MT Bold" charset="0"/>
+                <a:cs typeface="Arial Rounded MT Bold" charset="0"/>
+              </a:rPr>
+              <a:t>BlackJack</a:t>
+            </a:r>
+            <a:r>
+              <a:rPr lang="en-US" dirty="0" smtClean="0">
+                <a:latin typeface="Arial Rounded MT Bold" charset="0"/>
+                <a:ea typeface="Arial Rounded MT Bold" charset="0"/>
+                <a:cs typeface="Arial Rounded MT Bold" charset="0"/>
+              </a:rPr>
+              <a:t>)</a:t>
+            </a:r>
+          </a:p>
+          <a:p>
+            <a:endParaRPr lang="en-US" dirty="0">
+              <a:latin typeface="Arial Rounded MT Bold" charset="0"/>
+              <a:ea typeface="Arial Rounded MT Bold" charset="0"/>
+              <a:cs typeface="Arial Rounded MT Bold" charset="0"/>
+            </a:endParaRPr>
+          </a:p>
+          <a:p>
+            <a:endParaRPr lang="en-US" dirty="0" smtClean="0">
+              <a:latin typeface="Arial Rounded MT Bold" charset="0"/>
+              <a:ea typeface="Arial Rounded MT Bold" charset="0"/>
+              <a:cs typeface="Arial Rounded MT Bold" charset="0"/>
+            </a:endParaRPr>
+          </a:p>
+          <a:p>
+            <a:endParaRPr lang="en-US" dirty="0">
+              <a:latin typeface="Arial Rounded MT Bold" charset="0"/>
+              <a:ea typeface="Arial Rounded MT Bold" charset="0"/>
+              <a:cs typeface="Arial Rounded MT Bold" charset="0"/>
+            </a:endParaRPr>
+          </a:p>
+          <a:p>
+            <a:r>
+              <a:rPr lang="en-US" dirty="0" smtClean="0">
+                <a:latin typeface="Arial Rounded MT Bold" charset="0"/>
+                <a:ea typeface="Arial Rounded MT Bold" charset="0"/>
+                <a:cs typeface="Arial Rounded MT Bold" charset="0"/>
+              </a:rPr>
+              <a:t>And again, on dealers turn, to determine if </a:t>
+            </a:r>
+            <a:r>
+              <a:rPr lang="en-US" dirty="0" err="1" smtClean="0">
+                <a:latin typeface="Arial Rounded MT Bold" charset="0"/>
+                <a:ea typeface="Arial Rounded MT Bold" charset="0"/>
+                <a:cs typeface="Arial Rounded MT Bold" charset="0"/>
+              </a:rPr>
+              <a:t>BlackJack</a:t>
+            </a:r>
+            <a:r>
+              <a:rPr lang="en-US" dirty="0" smtClean="0">
+                <a:latin typeface="Arial Rounded MT Bold" charset="0"/>
+                <a:ea typeface="Arial Rounded MT Bold" charset="0"/>
+                <a:cs typeface="Arial Rounded MT Bold" charset="0"/>
+              </a:rPr>
+              <a:t> is present</a:t>
+            </a:r>
+            <a:endParaRPr lang="en-US" dirty="0">
+              <a:latin typeface="Arial Rounded MT Bold" charset="0"/>
+              <a:ea typeface="Arial Rounded MT Bold" charset="0"/>
+              <a:cs typeface="Arial Rounded MT Bold" charset="0"/>
+            </a:endParaRPr>
+          </a:p>
+        </p:txBody>
+      </p:sp>
     </p:spTree>
     <p:extLst>
       <p:ext uri="{BB962C8B-B14F-4D97-AF65-F5344CB8AC3E}">
-        <p14:creationId xmlns:p14="http://schemas.microsoft.com/office/powerpoint/2010/main" val="744859990"/>
+        <p14:creationId xmlns:p14="http://schemas.microsoft.com/office/powerpoint/2010/main" val="1210834762"/>
       </p:ext>
     </p:extLst>
   </p:cSld>

</xml_diff>